<commit_message>
minmaxcam config file synthethic o1b + mlflow info console output
</commit_message>
<xml_diff>
--- a/docs/pres_midterm.pptx
+++ b/docs/pres_midterm.pptx
@@ -6,7 +6,7 @@
     <p:sldMasterId id="2147484114" r:id="rId5"/>
   </p:sldMasterIdLst>
   <p:notesMasterIdLst>
-    <p:notesMasterId r:id="rId20"/>
+    <p:notesMasterId r:id="rId21"/>
   </p:notesMasterIdLst>
   <p:sldIdLst>
     <p:sldId id="257" r:id="rId6"/>
@@ -14,15 +14,16 @@
     <p:sldId id="304" r:id="rId8"/>
     <p:sldId id="305" r:id="rId9"/>
     <p:sldId id="307" r:id="rId10"/>
-    <p:sldId id="308" r:id="rId11"/>
-    <p:sldId id="309" r:id="rId12"/>
-    <p:sldId id="310" r:id="rId13"/>
-    <p:sldId id="296" r:id="rId14"/>
-    <p:sldId id="306" r:id="rId15"/>
-    <p:sldId id="278" r:id="rId16"/>
-    <p:sldId id="297" r:id="rId17"/>
-    <p:sldId id="279" r:id="rId18"/>
-    <p:sldId id="259" r:id="rId19"/>
+    <p:sldId id="309" r:id="rId11"/>
+    <p:sldId id="311" r:id="rId12"/>
+    <p:sldId id="312" r:id="rId13"/>
+    <p:sldId id="310" r:id="rId14"/>
+    <p:sldId id="296" r:id="rId15"/>
+    <p:sldId id="306" r:id="rId16"/>
+    <p:sldId id="278" r:id="rId17"/>
+    <p:sldId id="297" r:id="rId18"/>
+    <p:sldId id="279" r:id="rId19"/>
+    <p:sldId id="259" r:id="rId20"/>
   </p:sldIdLst>
   <p:sldSz cx="12192000" cy="6858000"/>
   <p:notesSz cx="6805613" cy="9944100"/>
@@ -270,7 +271,7 @@
           <a:p>
             <a:fld id="{EAE7EB73-2A46-9145-87B1-12A14A738614}" type="datetimeFigureOut">
               <a:rPr lang="en-BE" smtClean="0"/>
-              <a:t>29/01/2023</a:t>
+              <a:t>04/02/2023</a:t>
             </a:fld>
             <a:endParaRPr lang="en-BE"/>
           </a:p>
@@ -582,7 +583,181 @@
           <a:bodyPr/>
           <a:lstStyle/>
           <a:p>
-            <a:endParaRPr lang="en-BE" dirty="0"/>
+            <a:r>
+              <a:rPr lang="en-BE" dirty="0"/>
+              <a:t>The </a:t>
+            </a:r>
+            <a:r>
+              <a:rPr lang="en-BE" baseline="0" dirty="0"/>
+              <a:t>research topic of this thesis is called “multiple-instance weakly supervised object localization” (multiple-instance WSOL).</a:t>
+            </a:r>
+          </a:p>
+          <a:p>
+            <a:r>
+              <a:rPr lang="en-BE" baseline="0" dirty="0"/>
+              <a:t>Let’s look at the picture to explain the topic in the field of object recognition tasks. From left to right we have:</a:t>
+            </a:r>
+          </a:p>
+          <a:p>
+            <a:endParaRPr lang="en-BE" baseline="0" dirty="0"/>
+          </a:p>
+          <a:p>
+            <a:pPr marL="171450" indent="-171450">
+              <a:buFont typeface="Arial" panose="020B0604020202020204" pitchFamily="34" charset="0"/>
+              <a:buChar char="•"/>
+            </a:pPr>
+            <a:r>
+              <a:rPr lang="en-BE" b="1" dirty="0"/>
+              <a:t>Image classification</a:t>
+            </a:r>
+            <a:r>
+              <a:rPr lang="en-BE" b="0" baseline="0" dirty="0"/>
+              <a:t> </a:t>
+            </a:r>
+            <a:r>
+              <a:rPr lang="en-BE" dirty="0"/>
+              <a:t>deals with assigning a single label or category) to</a:t>
+            </a:r>
+            <a:r>
+              <a:rPr lang="en-BE" baseline="0" dirty="0"/>
+              <a:t> an image. Here the label is CAT.</a:t>
+            </a:r>
+          </a:p>
+          <a:p>
+            <a:pPr marL="171450" indent="-171450">
+              <a:buFont typeface="Arial" panose="020B0604020202020204" pitchFamily="34" charset="0"/>
+              <a:buChar char="•"/>
+            </a:pPr>
+            <a:r>
+              <a:rPr lang="en-BE" b="1" baseline="0" dirty="0"/>
+              <a:t>Object localization</a:t>
+            </a:r>
+            <a:r>
+              <a:rPr lang="en-BE" b="0" baseline="0" dirty="0"/>
+              <a:t> deals with localizing objects in an image by indicating their bounding box. In the case of </a:t>
+            </a:r>
+            <a:r>
+              <a:rPr lang="en-BE" b="1" baseline="0" dirty="0"/>
+              <a:t>WSOL</a:t>
+            </a:r>
+            <a:r>
+              <a:rPr lang="en-BE" b="0" baseline="0" dirty="0"/>
+              <a:t>, only a single object is localized.</a:t>
+            </a:r>
+          </a:p>
+          <a:p>
+            <a:pPr marL="171450" indent="-171450">
+              <a:buFont typeface="Arial" panose="020B0604020202020204" pitchFamily="34" charset="0"/>
+              <a:buChar char="•"/>
+            </a:pPr>
+            <a:r>
+              <a:rPr lang="en-BE" b="1" baseline="0" dirty="0"/>
+              <a:t>Object detection</a:t>
+            </a:r>
+            <a:r>
+              <a:rPr lang="en-BE" b="0" baseline="0" dirty="0"/>
+              <a:t> is the task of locating objects in an image with bounding boxes and assigning a class label for each detection.</a:t>
+            </a:r>
+          </a:p>
+          <a:p>
+            <a:pPr marL="171450" indent="-171450">
+              <a:buFont typeface="Arial" panose="020B0604020202020204" pitchFamily="34" charset="0"/>
+              <a:buChar char="•"/>
+            </a:pPr>
+            <a:r>
+              <a:rPr lang="en-BE" b="1" baseline="0" dirty="0"/>
+              <a:t>Instance segmentation</a:t>
+            </a:r>
+            <a:r>
+              <a:rPr lang="en-BE" b="0" baseline="0" dirty="0"/>
+              <a:t> deals with assigning a class label for each pixel of an image.</a:t>
+            </a:r>
+            <a:endParaRPr lang="en-BE" b="1" baseline="0" dirty="0"/>
+          </a:p>
+          <a:p>
+            <a:pPr marL="171450" indent="-171450">
+              <a:buFont typeface="Arial" panose="020B0604020202020204" pitchFamily="34" charset="0"/>
+              <a:buChar char="•"/>
+            </a:pPr>
+            <a:endParaRPr lang="en-BE" b="0" baseline="0" dirty="0"/>
+          </a:p>
+          <a:p>
+            <a:r>
+              <a:rPr lang="en-GB" sz="1200" kern="1200" dirty="0">
+                <a:solidFill>
+                  <a:schemeClr val="tx1"/>
+                </a:solidFill>
+                <a:effectLst/>
+                <a:latin typeface="+mn-lt"/>
+                <a:ea typeface="+mn-ea"/>
+                <a:cs typeface="+mn-cs"/>
+              </a:rPr>
+              <a:t>In this project I will</a:t>
+            </a:r>
+          </a:p>
+          <a:p>
+            <a:pPr marL="171450" indent="-171450">
+              <a:buFont typeface="Arial" panose="020B0604020202020204" pitchFamily="34" charset="0"/>
+              <a:buChar char="•"/>
+            </a:pPr>
+            <a:r>
+              <a:rPr lang="en-GB" sz="1200" kern="1200" dirty="0">
+                <a:solidFill>
+                  <a:schemeClr val="tx1"/>
+                </a:solidFill>
+                <a:effectLst/>
+                <a:latin typeface="+mn-lt"/>
+                <a:ea typeface="+mn-ea"/>
+                <a:cs typeface="+mn-cs"/>
+              </a:rPr>
+              <a:t>assess the performance of specific WSOL methods for images with multiple object instances</a:t>
+            </a:r>
+          </a:p>
+          <a:p>
+            <a:pPr marL="171450" indent="-171450">
+              <a:buFont typeface="Arial" panose="020B0604020202020204" pitchFamily="34" charset="0"/>
+              <a:buChar char="•"/>
+            </a:pPr>
+            <a:r>
+              <a:rPr lang="en-GB" sz="1200" kern="1200" dirty="0">
+                <a:solidFill>
+                  <a:schemeClr val="tx1"/>
+                </a:solidFill>
+                <a:effectLst/>
+                <a:latin typeface="+mn-lt"/>
+                <a:ea typeface="+mn-ea"/>
+                <a:cs typeface="+mn-cs"/>
+              </a:rPr>
+              <a:t>Investigate mechanisms for those WSOL methods</a:t>
+            </a:r>
+            <a:r>
+              <a:rPr lang="en-GB" sz="1200" kern="1200" baseline="0" dirty="0">
+                <a:solidFill>
+                  <a:schemeClr val="tx1"/>
+                </a:solidFill>
+                <a:effectLst/>
+                <a:latin typeface="+mn-lt"/>
+                <a:ea typeface="+mn-ea"/>
+                <a:cs typeface="+mn-cs"/>
+              </a:rPr>
+              <a:t> to improve localization of multiple object instances in images</a:t>
+            </a:r>
+            <a:endParaRPr lang="en-BE" sz="1200" kern="1200" dirty="0">
+              <a:solidFill>
+                <a:schemeClr val="tx1"/>
+              </a:solidFill>
+              <a:effectLst/>
+              <a:latin typeface="+mn-lt"/>
+              <a:ea typeface="+mn-ea"/>
+              <a:cs typeface="+mn-cs"/>
+            </a:endParaRPr>
+          </a:p>
+          <a:p>
+            <a:pPr marL="0" indent="0">
+              <a:buFont typeface="Arial" panose="020B0604020202020204" pitchFamily="34" charset="0"/>
+              <a:buNone/>
+            </a:pPr>
+            <a:endParaRPr lang="en-BE" b="0" baseline="0" dirty="0"/>
           </a:p>
         </p:txBody>
       </p:sp>
@@ -603,7 +778,175 @@
           <a:p>
             <a:fld id="{80776EF6-B42D-624A-9B9C-BBF9E595853E}" type="slidenum">
               <a:rPr lang="en-BE" smtClean="0"/>
-              <a:t>8</a:t>
+              <a:t>5</a:t>
+            </a:fld>
+            <a:endParaRPr lang="en-BE"/>
+          </a:p>
+        </p:txBody>
+      </p:sp>
+    </p:spTree>
+    <p:extLst>
+      <p:ext uri="{BB962C8B-B14F-4D97-AF65-F5344CB8AC3E}">
+        <p14:creationId xmlns:p14="http://schemas.microsoft.com/office/powerpoint/2010/main" val="3072439873"/>
+      </p:ext>
+    </p:extLst>
+  </p:cSld>
+  <p:clrMapOvr>
+    <a:masterClrMapping/>
+  </p:clrMapOvr>
+</p:notes>
+</file>
+
+<file path=ppt/notesSlides/notesSlide2.xml><?xml version="1.0" encoding="utf-8"?>
+<p:notes xmlns:a="http://schemas.openxmlformats.org/drawingml/2006/main" xmlns:r="http://schemas.openxmlformats.org/officeDocument/2006/relationships" xmlns:p="http://schemas.openxmlformats.org/presentationml/2006/main">
+  <p:cSld>
+    <p:spTree>
+      <p:nvGrpSpPr>
+        <p:cNvPr id="1" name=""/>
+        <p:cNvGrpSpPr/>
+        <p:nvPr/>
+      </p:nvGrpSpPr>
+      <p:grpSpPr>
+        <a:xfrm>
+          <a:off x="0" y="0"/>
+          <a:ext cx="0" cy="0"/>
+          <a:chOff x="0" y="0"/>
+          <a:chExt cx="0" cy="0"/>
+        </a:xfrm>
+      </p:grpSpPr>
+      <p:sp>
+        <p:nvSpPr>
+          <p:cNvPr id="2" name="Slide Image Placeholder 1"/>
+          <p:cNvSpPr>
+            <a:spLocks noGrp="1" noRot="1" noChangeAspect="1"/>
+          </p:cNvSpPr>
+          <p:nvPr>
+            <p:ph type="sldImg"/>
+          </p:nvPr>
+        </p:nvSpPr>
+        <p:spPr/>
+      </p:sp>
+      <p:sp>
+        <p:nvSpPr>
+          <p:cNvPr id="3" name="Notes Placeholder 2"/>
+          <p:cNvSpPr>
+            <a:spLocks noGrp="1"/>
+          </p:cNvSpPr>
+          <p:nvPr>
+            <p:ph type="body" idx="1"/>
+          </p:nvPr>
+        </p:nvSpPr>
+        <p:spPr/>
+        <p:txBody>
+          <a:bodyPr/>
+          <a:lstStyle/>
+          <a:p>
+            <a:endParaRPr lang="en-BE"/>
+          </a:p>
+        </p:txBody>
+      </p:sp>
+      <p:sp>
+        <p:nvSpPr>
+          <p:cNvPr id="4" name="Slide Number Placeholder 3"/>
+          <p:cNvSpPr>
+            <a:spLocks noGrp="1"/>
+          </p:cNvSpPr>
+          <p:nvPr>
+            <p:ph type="sldNum" sz="quarter" idx="5"/>
+          </p:nvPr>
+        </p:nvSpPr>
+        <p:spPr/>
+        <p:txBody>
+          <a:bodyPr/>
+          <a:lstStyle/>
+          <a:p>
+            <a:fld id="{80776EF6-B42D-624A-9B9C-BBF9E595853E}" type="slidenum">
+              <a:rPr lang="en-BE" smtClean="0"/>
+              <a:t>7</a:t>
+            </a:fld>
+            <a:endParaRPr lang="en-BE"/>
+          </a:p>
+        </p:txBody>
+      </p:sp>
+    </p:spTree>
+    <p:extLst>
+      <p:ext uri="{BB962C8B-B14F-4D97-AF65-F5344CB8AC3E}">
+        <p14:creationId xmlns:p14="http://schemas.microsoft.com/office/powerpoint/2010/main" val="2663390313"/>
+      </p:ext>
+    </p:extLst>
+  </p:cSld>
+  <p:clrMapOvr>
+    <a:masterClrMapping/>
+  </p:clrMapOvr>
+</p:notes>
+</file>
+
+<file path=ppt/notesSlides/notesSlide3.xml><?xml version="1.0" encoding="utf-8"?>
+<p:notes xmlns:a="http://schemas.openxmlformats.org/drawingml/2006/main" xmlns:r="http://schemas.openxmlformats.org/officeDocument/2006/relationships" xmlns:p="http://schemas.openxmlformats.org/presentationml/2006/main">
+  <p:cSld>
+    <p:spTree>
+      <p:nvGrpSpPr>
+        <p:cNvPr id="1" name=""/>
+        <p:cNvGrpSpPr/>
+        <p:nvPr/>
+      </p:nvGrpSpPr>
+      <p:grpSpPr>
+        <a:xfrm>
+          <a:off x="0" y="0"/>
+          <a:ext cx="0" cy="0"/>
+          <a:chOff x="0" y="0"/>
+          <a:chExt cx="0" cy="0"/>
+        </a:xfrm>
+      </p:grpSpPr>
+      <p:sp>
+        <p:nvSpPr>
+          <p:cNvPr id="2" name="Slide Image Placeholder 1"/>
+          <p:cNvSpPr>
+            <a:spLocks noGrp="1" noRot="1" noChangeAspect="1"/>
+          </p:cNvSpPr>
+          <p:nvPr>
+            <p:ph type="sldImg"/>
+          </p:nvPr>
+        </p:nvSpPr>
+        <p:spPr/>
+      </p:sp>
+      <p:sp>
+        <p:nvSpPr>
+          <p:cNvPr id="3" name="Notes Placeholder 2"/>
+          <p:cNvSpPr>
+            <a:spLocks noGrp="1"/>
+          </p:cNvSpPr>
+          <p:nvPr>
+            <p:ph type="body" idx="1"/>
+          </p:nvPr>
+        </p:nvSpPr>
+        <p:spPr/>
+        <p:txBody>
+          <a:bodyPr/>
+          <a:lstStyle/>
+          <a:p>
+            <a:endParaRPr lang="en-BE" dirty="0"/>
+          </a:p>
+        </p:txBody>
+      </p:sp>
+      <p:sp>
+        <p:nvSpPr>
+          <p:cNvPr id="4" name="Slide Number Placeholder 3"/>
+          <p:cNvSpPr>
+            <a:spLocks noGrp="1"/>
+          </p:cNvSpPr>
+          <p:nvPr>
+            <p:ph type="sldNum" sz="quarter" idx="5"/>
+          </p:nvPr>
+        </p:nvSpPr>
+        <p:spPr/>
+        <p:txBody>
+          <a:bodyPr/>
+          <a:lstStyle/>
+          <a:p>
+            <a:fld id="{80776EF6-B42D-624A-9B9C-BBF9E595853E}" type="slidenum">
+              <a:rPr lang="en-BE" smtClean="0"/>
+              <a:t>9</a:t>
             </a:fld>
             <a:endParaRPr lang="en-BE"/>
           </a:p>
@@ -10050,7 +10393,7 @@
           <p:cNvPr id="2" name="Title 1">
             <a:extLst>
               <a:ext uri="{FF2B5EF4-FFF2-40B4-BE49-F238E27FC236}">
-                <a16:creationId xmlns:a16="http://schemas.microsoft.com/office/drawing/2014/main" id="{CF343AF8-9168-960A-B019-C2A49A61CA61}"/>
+                <a16:creationId xmlns:a16="http://schemas.microsoft.com/office/drawing/2014/main" id="{BA529C6E-45F6-EC47-9E62-697FE893C136}"/>
               </a:ext>
             </a:extLst>
           </p:cNvPr>
@@ -10066,24 +10409,27 @@
           <a:bodyPr/>
           <a:lstStyle/>
           <a:p>
-            <a:endParaRPr lang="en-BE"/>
-          </a:p>
-        </p:txBody>
-      </p:sp>
-      <p:sp>
-        <p:nvSpPr>
-          <p:cNvPr id="3" name="Slide Number Placeholder 2">
-            <a:extLst>
-              <a:ext uri="{FF2B5EF4-FFF2-40B4-BE49-F238E27FC236}">
-                <a16:creationId xmlns:a16="http://schemas.microsoft.com/office/drawing/2014/main" id="{26F5DA41-503D-310A-778E-CB715322F038}"/>
-              </a:ext>
-            </a:extLst>
-          </p:cNvPr>
-          <p:cNvSpPr>
-            <a:spLocks noGrp="1"/>
-          </p:cNvSpPr>
-          <p:nvPr>
-            <p:ph type="sldNum" sz="quarter" idx="10"/>
+            <a:r>
+              <a:rPr lang="en-US" noProof="0" dirty="0"/>
+              <a:t>Method</a:t>
+            </a:r>
+          </a:p>
+        </p:txBody>
+      </p:sp>
+      <p:sp>
+        <p:nvSpPr>
+          <p:cNvPr id="3" name="Text Placeholder 2">
+            <a:extLst>
+              <a:ext uri="{FF2B5EF4-FFF2-40B4-BE49-F238E27FC236}">
+                <a16:creationId xmlns:a16="http://schemas.microsoft.com/office/drawing/2014/main" id="{AB02AE85-0D8F-2941-B863-417E24478159}"/>
+              </a:ext>
+            </a:extLst>
+          </p:cNvPr>
+          <p:cNvSpPr>
+            <a:spLocks noGrp="1"/>
+          </p:cNvSpPr>
+          <p:nvPr>
+            <p:ph type="body" sz="quarter" idx="10"/>
           </p:nvPr>
         </p:nvSpPr>
         <p:spPr/>
@@ -10091,47 +10437,14 @@
           <a:bodyPr/>
           <a:lstStyle/>
           <a:p>
-            <a:fld id="{E038E271-308C-2E46-A3EC-56326F9084CC}" type="slidenum">
-              <a:rPr lang="nl-BE" smtClean="0"/>
-              <a:pPr/>
-              <a:t>10</a:t>
-            </a:fld>
-            <a:endParaRPr lang="nl-BE" dirty="0"/>
-          </a:p>
-        </p:txBody>
-      </p:sp>
-      <p:sp>
-        <p:nvSpPr>
-          <p:cNvPr id="4" name="Text Placeholder 3">
-            <a:extLst>
-              <a:ext uri="{FF2B5EF4-FFF2-40B4-BE49-F238E27FC236}">
-                <a16:creationId xmlns:a16="http://schemas.microsoft.com/office/drawing/2014/main" id="{D340C622-1ED9-B7A7-DD2B-71727414C6DE}"/>
-              </a:ext>
-            </a:extLst>
-          </p:cNvPr>
-          <p:cNvSpPr>
-            <a:spLocks noGrp="1"/>
-          </p:cNvSpPr>
-          <p:nvPr>
-            <p:ph type="body" sz="quarter" idx="11"/>
-          </p:nvPr>
-        </p:nvSpPr>
-        <p:spPr/>
-        <p:txBody>
-          <a:bodyPr/>
-          <a:lstStyle/>
-          <a:p>
-            <a:r>
-              <a:rPr lang="en-BE" dirty="0"/>
-              <a:t>Explain multi-instance evaluation protocol</a:t>
-            </a:r>
+            <a:endParaRPr lang="en-US" dirty="0"/>
           </a:p>
         </p:txBody>
       </p:sp>
     </p:spTree>
     <p:extLst>
       <p:ext uri="{BB962C8B-B14F-4D97-AF65-F5344CB8AC3E}">
-        <p14:creationId xmlns:p14="http://schemas.microsoft.com/office/powerpoint/2010/main" val="2482707471"/>
+        <p14:creationId xmlns:p14="http://schemas.microsoft.com/office/powerpoint/2010/main" val="3550223122"/>
       </p:ext>
     </p:extLst>
   </p:cSld>
@@ -10163,7 +10476,7 @@
           <p:cNvPr id="2" name="Title 1">
             <a:extLst>
               <a:ext uri="{FF2B5EF4-FFF2-40B4-BE49-F238E27FC236}">
-                <a16:creationId xmlns:a16="http://schemas.microsoft.com/office/drawing/2014/main" id="{BA529C6E-45F6-EC47-9E62-697FE893C136}"/>
+                <a16:creationId xmlns:a16="http://schemas.microsoft.com/office/drawing/2014/main" id="{CF343AF8-9168-960A-B019-C2A49A61CA61}"/>
               </a:ext>
             </a:extLst>
           </p:cNvPr>
@@ -10179,28 +10492,24 @@
           <a:bodyPr/>
           <a:lstStyle/>
           <a:p>
-            <a:r>
-              <a:rPr lang="en-US" noProof="0"/>
-              <a:t>Experiments</a:t>
-            </a:r>
-            <a:endParaRPr lang="en-US" noProof="0" dirty="0"/>
-          </a:p>
-        </p:txBody>
-      </p:sp>
-      <p:sp>
-        <p:nvSpPr>
-          <p:cNvPr id="3" name="Text Placeholder 2">
-            <a:extLst>
-              <a:ext uri="{FF2B5EF4-FFF2-40B4-BE49-F238E27FC236}">
-                <a16:creationId xmlns:a16="http://schemas.microsoft.com/office/drawing/2014/main" id="{AB02AE85-0D8F-2941-B863-417E24478159}"/>
-              </a:ext>
-            </a:extLst>
-          </p:cNvPr>
-          <p:cNvSpPr>
-            <a:spLocks noGrp="1"/>
-          </p:cNvSpPr>
-          <p:nvPr>
-            <p:ph type="body" sz="quarter" idx="10"/>
+            <a:endParaRPr lang="en-BE" dirty="0"/>
+          </a:p>
+        </p:txBody>
+      </p:sp>
+      <p:sp>
+        <p:nvSpPr>
+          <p:cNvPr id="3" name="Slide Number Placeholder 2">
+            <a:extLst>
+              <a:ext uri="{FF2B5EF4-FFF2-40B4-BE49-F238E27FC236}">
+                <a16:creationId xmlns:a16="http://schemas.microsoft.com/office/drawing/2014/main" id="{26F5DA41-503D-310A-778E-CB715322F038}"/>
+              </a:ext>
+            </a:extLst>
+          </p:cNvPr>
+          <p:cNvSpPr>
+            <a:spLocks noGrp="1"/>
+          </p:cNvSpPr>
+          <p:nvPr>
+            <p:ph type="sldNum" sz="quarter" idx="10"/>
           </p:nvPr>
         </p:nvSpPr>
         <p:spPr/>
@@ -10208,14 +10517,47 @@
           <a:bodyPr/>
           <a:lstStyle/>
           <a:p>
-            <a:endParaRPr lang="en-US" dirty="0"/>
+            <a:fld id="{E038E271-308C-2E46-A3EC-56326F9084CC}" type="slidenum">
+              <a:rPr lang="nl-BE" smtClean="0"/>
+              <a:pPr/>
+              <a:t>11</a:t>
+            </a:fld>
+            <a:endParaRPr lang="nl-BE" dirty="0"/>
+          </a:p>
+        </p:txBody>
+      </p:sp>
+      <p:sp>
+        <p:nvSpPr>
+          <p:cNvPr id="4" name="Text Placeholder 3">
+            <a:extLst>
+              <a:ext uri="{FF2B5EF4-FFF2-40B4-BE49-F238E27FC236}">
+                <a16:creationId xmlns:a16="http://schemas.microsoft.com/office/drawing/2014/main" id="{D340C622-1ED9-B7A7-DD2B-71727414C6DE}"/>
+              </a:ext>
+            </a:extLst>
+          </p:cNvPr>
+          <p:cNvSpPr>
+            <a:spLocks noGrp="1"/>
+          </p:cNvSpPr>
+          <p:nvPr>
+            <p:ph type="body" sz="quarter" idx="11"/>
+          </p:nvPr>
+        </p:nvSpPr>
+        <p:spPr/>
+        <p:txBody>
+          <a:bodyPr/>
+          <a:lstStyle/>
+          <a:p>
+            <a:r>
+              <a:rPr lang="en-BE" dirty="0"/>
+              <a:t>Explain multi-instance evaluation protocol</a:t>
+            </a:r>
           </a:p>
         </p:txBody>
       </p:sp>
     </p:spTree>
     <p:extLst>
       <p:ext uri="{BB962C8B-B14F-4D97-AF65-F5344CB8AC3E}">
-        <p14:creationId xmlns:p14="http://schemas.microsoft.com/office/powerpoint/2010/main" val="1843490164"/>
+        <p14:creationId xmlns:p14="http://schemas.microsoft.com/office/powerpoint/2010/main" val="2482707471"/>
       </p:ext>
     </p:extLst>
   </p:cSld>
@@ -10265,7 +10607,7 @@
           <a:p>
             <a:r>
               <a:rPr lang="en-US" noProof="0" dirty="0"/>
-              <a:t>Problems</a:t>
+              <a:t>Experiments</a:t>
             </a:r>
           </a:p>
         </p:txBody>
@@ -10298,7 +10640,7 @@
     </p:spTree>
     <p:extLst>
       <p:ext uri="{BB962C8B-B14F-4D97-AF65-F5344CB8AC3E}">
-        <p14:creationId xmlns:p14="http://schemas.microsoft.com/office/powerpoint/2010/main" val="2536176281"/>
+        <p14:creationId xmlns:p14="http://schemas.microsoft.com/office/powerpoint/2010/main" val="1843490164"/>
       </p:ext>
     </p:extLst>
   </p:cSld>
@@ -10347,6 +10689,89 @@
           <a:lstStyle/>
           <a:p>
             <a:r>
+              <a:rPr lang="en-US" noProof="0" dirty="0"/>
+              <a:t>Problems</a:t>
+            </a:r>
+          </a:p>
+        </p:txBody>
+      </p:sp>
+      <p:sp>
+        <p:nvSpPr>
+          <p:cNvPr id="3" name="Text Placeholder 2">
+            <a:extLst>
+              <a:ext uri="{FF2B5EF4-FFF2-40B4-BE49-F238E27FC236}">
+                <a16:creationId xmlns:a16="http://schemas.microsoft.com/office/drawing/2014/main" id="{AB02AE85-0D8F-2941-B863-417E24478159}"/>
+              </a:ext>
+            </a:extLst>
+          </p:cNvPr>
+          <p:cNvSpPr>
+            <a:spLocks noGrp="1"/>
+          </p:cNvSpPr>
+          <p:nvPr>
+            <p:ph type="body" sz="quarter" idx="10"/>
+          </p:nvPr>
+        </p:nvSpPr>
+        <p:spPr/>
+        <p:txBody>
+          <a:bodyPr/>
+          <a:lstStyle/>
+          <a:p>
+            <a:endParaRPr lang="en-US" dirty="0"/>
+          </a:p>
+        </p:txBody>
+      </p:sp>
+    </p:spTree>
+    <p:extLst>
+      <p:ext uri="{BB962C8B-B14F-4D97-AF65-F5344CB8AC3E}">
+        <p14:creationId xmlns:p14="http://schemas.microsoft.com/office/powerpoint/2010/main" val="2536176281"/>
+      </p:ext>
+    </p:extLst>
+  </p:cSld>
+  <p:clrMapOvr>
+    <a:masterClrMapping/>
+  </p:clrMapOvr>
+</p:sld>
+</file>
+
+<file path=ppt/slides/slide14.xml><?xml version="1.0" encoding="utf-8"?>
+<p:sld xmlns:a="http://schemas.openxmlformats.org/drawingml/2006/main" xmlns:r="http://schemas.openxmlformats.org/officeDocument/2006/relationships" xmlns:p="http://schemas.openxmlformats.org/presentationml/2006/main">
+  <p:cSld>
+    <p:spTree>
+      <p:nvGrpSpPr>
+        <p:cNvPr id="1" name=""/>
+        <p:cNvGrpSpPr/>
+        <p:nvPr/>
+      </p:nvGrpSpPr>
+      <p:grpSpPr>
+        <a:xfrm>
+          <a:off x="0" y="0"/>
+          <a:ext cx="0" cy="0"/>
+          <a:chOff x="0" y="0"/>
+          <a:chExt cx="0" cy="0"/>
+        </a:xfrm>
+      </p:grpSpPr>
+      <p:sp>
+        <p:nvSpPr>
+          <p:cNvPr id="2" name="Title 1">
+            <a:extLst>
+              <a:ext uri="{FF2B5EF4-FFF2-40B4-BE49-F238E27FC236}">
+                <a16:creationId xmlns:a16="http://schemas.microsoft.com/office/drawing/2014/main" id="{BA529C6E-45F6-EC47-9E62-697FE893C136}"/>
+              </a:ext>
+            </a:extLst>
+          </p:cNvPr>
+          <p:cNvSpPr>
+            <a:spLocks noGrp="1"/>
+          </p:cNvSpPr>
+          <p:nvPr>
+            <p:ph type="title"/>
+          </p:nvPr>
+        </p:nvSpPr>
+        <p:spPr/>
+        <p:txBody>
+          <a:bodyPr/>
+          <a:lstStyle/>
+          <a:p>
+            <a:r>
               <a:rPr lang="en-US" dirty="0"/>
               <a:t>Next steps</a:t>
             </a:r>
@@ -10392,7 +10817,7 @@
 </p:sld>
 </file>
 
-<file path=ppt/slides/slide14.xml><?xml version="1.0" encoding="utf-8"?>
+<file path=ppt/slides/slide15.xml><?xml version="1.0" encoding="utf-8"?>
 <p:sld xmlns:a="http://schemas.openxmlformats.org/drawingml/2006/main" xmlns:r="http://schemas.openxmlformats.org/officeDocument/2006/relationships" xmlns:p="http://schemas.openxmlformats.org/presentationml/2006/main">
   <p:cSld>
     <p:spTree>
@@ -10823,18 +11248,7 @@
                 <a:ea typeface="Calibri" panose="020F0502020204030204" pitchFamily="34" charset="0"/>
                 <a:cs typeface="Helvetica Neue" panose="02000503000000020004" pitchFamily="2" charset="0"/>
               </a:rPr>
-              <a:t>State research </a:t>
-            </a:r>
-            <a:r>
-              <a:rPr lang="en-GB" sz="1800" dirty="0" err="1">
-                <a:solidFill>
-                  <a:srgbClr val="000000"/>
-                </a:solidFill>
-                <a:latin typeface="Helvetica Neue" panose="02000503000000020004" pitchFamily="2" charset="0"/>
-                <a:ea typeface="Calibri" panose="020F0502020204030204" pitchFamily="34" charset="0"/>
-                <a:cs typeface="Helvetica Neue" panose="02000503000000020004" pitchFamily="2" charset="0"/>
-              </a:rPr>
-              <a:t>questioin</a:t>
+              <a:t>State research question</a:t>
             </a:r>
             <a:endParaRPr lang="en-BE" sz="1800" dirty="0">
               <a:effectLst/>
@@ -10875,6 +11289,69 @@
           <a:chExt cx="0" cy="0"/>
         </a:xfrm>
       </p:grpSpPr>
+      <p:sp>
+        <p:nvSpPr>
+          <p:cNvPr id="2" name="Title 1">
+            <a:extLst>
+              <a:ext uri="{FF2B5EF4-FFF2-40B4-BE49-F238E27FC236}">
+                <a16:creationId xmlns:a16="http://schemas.microsoft.com/office/drawing/2014/main" id="{794421BF-63AE-2161-FEE1-A14A7472FABC}"/>
+              </a:ext>
+            </a:extLst>
+          </p:cNvPr>
+          <p:cNvSpPr>
+            <a:spLocks noGrp="1"/>
+          </p:cNvSpPr>
+          <p:nvPr>
+            <p:ph type="title"/>
+          </p:nvPr>
+        </p:nvSpPr>
+        <p:spPr>
+          <a:xfrm>
+            <a:off x="636587" y="620713"/>
+            <a:ext cx="10944226" cy="791794"/>
+          </a:xfrm>
+        </p:spPr>
+        <p:txBody>
+          <a:bodyPr/>
+          <a:lstStyle/>
+          <a:p>
+            <a:r>
+              <a:rPr lang="en-BE" dirty="0"/>
+              <a:t>Context: Object recognition tasks</a:t>
+            </a:r>
+          </a:p>
+        </p:txBody>
+      </p:sp>
+      <p:sp>
+        <p:nvSpPr>
+          <p:cNvPr id="3" name="Slide Number Placeholder 2">
+            <a:extLst>
+              <a:ext uri="{FF2B5EF4-FFF2-40B4-BE49-F238E27FC236}">
+                <a16:creationId xmlns:a16="http://schemas.microsoft.com/office/drawing/2014/main" id="{E6FB7E31-8969-72F0-6E29-E2383B743067}"/>
+              </a:ext>
+            </a:extLst>
+          </p:cNvPr>
+          <p:cNvSpPr>
+            <a:spLocks noGrp="1"/>
+          </p:cNvSpPr>
+          <p:nvPr>
+            <p:ph type="sldNum" sz="quarter" idx="10"/>
+          </p:nvPr>
+        </p:nvSpPr>
+        <p:spPr/>
+        <p:txBody>
+          <a:bodyPr/>
+          <a:lstStyle/>
+          <a:p>
+            <a:fld id="{E038E271-308C-2E46-A3EC-56326F9084CC}" type="slidenum">
+              <a:rPr lang="nl-BE" smtClean="0"/>
+              <a:pPr/>
+              <a:t>5</a:t>
+            </a:fld>
+            <a:endParaRPr lang="nl-BE" dirty="0"/>
+          </a:p>
+        </p:txBody>
+      </p:sp>
       <p:pic>
         <p:nvPicPr>
           <p:cNvPr id="1026" name="Picture 2">
@@ -10890,7 +11367,7 @@
           <p:nvPr/>
         </p:nvPicPr>
         <p:blipFill>
-          <a:blip r:embed="rId2">
+          <a:blip r:embed="rId3">
             <a:extLst>
               <a:ext uri="{28A0092B-C50C-407E-A947-70E740481C1C}">
                 <a14:useLocalDpi xmlns:a14="http://schemas.microsoft.com/office/drawing/2010/main" val="0"/>
@@ -10904,8 +11381,8 @@
         </p:blipFill>
         <p:spPr bwMode="auto">
           <a:xfrm>
-            <a:off x="2246052" y="1222007"/>
-            <a:ext cx="7699895" cy="3248393"/>
+            <a:off x="2043628" y="1613898"/>
+            <a:ext cx="8104745" cy="3419189"/>
           </a:xfrm>
           <a:prstGeom prst="rect">
             <a:avLst/>
@@ -10922,259 +11399,479 @@
           </a:extLst>
         </p:spPr>
       </p:pic>
-      <p:sp>
-        <p:nvSpPr>
-          <p:cNvPr id="7" name="Rectangle 6">
-            <a:extLst>
-              <a:ext uri="{FF2B5EF4-FFF2-40B4-BE49-F238E27FC236}">
-                <a16:creationId xmlns:a16="http://schemas.microsoft.com/office/drawing/2014/main" id="{5BE6331D-2C26-6F21-BCA5-C60B6855571F}"/>
-              </a:ext>
-            </a:extLst>
-          </p:cNvPr>
-          <p:cNvSpPr/>
+      <p:grpSp>
+        <p:nvGrpSpPr>
+          <p:cNvPr id="32" name="Group 31">
+            <a:extLst>
+              <a:ext uri="{FF2B5EF4-FFF2-40B4-BE49-F238E27FC236}">
+                <a16:creationId xmlns:a16="http://schemas.microsoft.com/office/drawing/2014/main" id="{0EA5B147-62C0-13BC-F800-780B4E80F710}"/>
+              </a:ext>
+            </a:extLst>
+          </p:cNvPr>
+          <p:cNvGrpSpPr/>
           <p:nvPr/>
-        </p:nvSpPr>
-        <p:spPr bwMode="auto">
+        </p:nvGrpSpPr>
+        <p:grpSpPr>
           <a:xfrm>
-            <a:off x="4114800" y="1222007"/>
-            <a:ext cx="2654300" cy="3248393"/>
+            <a:off x="4003157" y="3981590"/>
+            <a:ext cx="2583719" cy="2136136"/>
+            <a:chOff x="4003157" y="3981590"/>
+            <a:chExt cx="2583719" cy="2136136"/>
           </a:xfrm>
-          <a:prstGeom prst="rect">
-            <a:avLst/>
-          </a:prstGeom>
-          <a:solidFill>
-            <a:srgbClr val="FFC000">
-              <a:alpha val="16000"/>
-            </a:srgbClr>
-          </a:solidFill>
-          <a:ln w="38100">
-            <a:solidFill>
-              <a:srgbClr val="FFC000"/>
-            </a:solidFill>
-            <a:prstDash val="dash"/>
-          </a:ln>
-          <a:extLst>
-            <a:ext uri="{91240B29-F687-4f45-9708-019B960494DF}">
-              <a14:hiddenLine xmlns="" xmlns:a14="http://schemas.microsoft.com/office/drawing/2010/main" w="9525">
+        </p:grpSpPr>
+        <p:sp>
+          <p:nvSpPr>
+            <p:cNvPr id="18" name="TextBox 17">
+              <a:extLst>
+                <a:ext uri="{FF2B5EF4-FFF2-40B4-BE49-F238E27FC236}">
+                  <a16:creationId xmlns:a16="http://schemas.microsoft.com/office/drawing/2014/main" id="{74275B2B-21BA-1C54-0617-39B0183E4CCC}"/>
+                </a:ext>
+              </a:extLst>
+            </p:cNvPr>
+            <p:cNvSpPr txBox="1"/>
+            <p:nvPr/>
+          </p:nvSpPr>
+          <p:spPr>
+            <a:xfrm>
+              <a:off x="4003157" y="5841677"/>
+              <a:ext cx="2583707" cy="276049"/>
+            </a:xfrm>
+            <a:prstGeom prst="rect">
+              <a:avLst/>
+            </a:prstGeom>
+            <a:noFill/>
+          </p:spPr>
+          <p:txBody>
+            <a:bodyPr wrap="square" lIns="0" tIns="0" rIns="0" bIns="0" rtlCol="0">
+              <a:noAutofit/>
+            </a:bodyPr>
+            <a:lstStyle/>
+            <a:p>
+              <a:pPr marL="0" indent="0" algn="ctr">
+                <a:buFont typeface="Arial" panose="020B0604020202020204" pitchFamily="34" charset="0"/>
+                <a:buNone/>
+              </a:pPr>
+              <a:r>
+                <a:rPr lang="en-US" sz="1600" b="1" dirty="0">
+                  <a:solidFill>
+                    <a:srgbClr val="C00000"/>
+                  </a:solidFill>
+                  <a:latin typeface="+mn-lt"/>
+                  <a:ea typeface="Verdana" panose="020B0604030504040204" pitchFamily="34" charset="0"/>
+                  <a:cs typeface="Verdana" panose="020B0604030504040204" pitchFamily="34" charset="0"/>
+                </a:rPr>
+                <a:t>Multiple-instance WSOL</a:t>
+              </a:r>
+              <a:endParaRPr lang="en-BE" sz="1600" b="1" dirty="0">
                 <a:solidFill>
-                  <a:srgbClr val="000000"/>
-                </a:solidFill>
-                <a:miter lim="800000"/>
-                <a:headEnd/>
-                <a:tailEnd/>
-              </a14:hiddenLine>
-            </a:ext>
-          </a:extLst>
-        </p:spPr>
-        <p:txBody>
-          <a:bodyPr lIns="180000" tIns="180000" rIns="180000" bIns="180000" rtlCol="0" anchor="ctr"/>
-          <a:lstStyle/>
-          <a:p>
-            <a:pPr marL="0" indent="0" algn="ctr">
-              <a:spcAft>
-                <a:spcPts val="450"/>
-              </a:spcAft>
-              <a:buFont typeface="Arial" charset="0"/>
-              <a:buNone/>
-            </a:pPr>
-            <a:endParaRPr lang="en-BE" sz="1800" b="1" dirty="0" err="1">
-              <a:solidFill>
-                <a:schemeClr val="bg1"/>
-              </a:solidFill>
-              <a:latin typeface="+mn-lt"/>
-              <a:ea typeface="Verdana Regular" charset="0"/>
-              <a:cs typeface="Verdana Regular" charset="0"/>
-              <a:sym typeface="Securitas Sans Light" charset="0"/>
-            </a:endParaRPr>
-          </a:p>
-        </p:txBody>
-      </p:sp>
-      <p:sp>
-        <p:nvSpPr>
-          <p:cNvPr id="2" name="Title 1">
-            <a:extLst>
-              <a:ext uri="{FF2B5EF4-FFF2-40B4-BE49-F238E27FC236}">
-                <a16:creationId xmlns:a16="http://schemas.microsoft.com/office/drawing/2014/main" id="{794421BF-63AE-2161-FEE1-A14A7472FABC}"/>
-              </a:ext>
-            </a:extLst>
-          </p:cNvPr>
-          <p:cNvSpPr>
-            <a:spLocks noGrp="1"/>
-          </p:cNvSpPr>
-          <p:nvPr>
-            <p:ph type="title"/>
-          </p:nvPr>
-        </p:nvSpPr>
-        <p:spPr>
-          <a:xfrm>
-            <a:off x="636587" y="620713"/>
-            <a:ext cx="10944226" cy="791794"/>
-          </a:xfrm>
-        </p:spPr>
-        <p:txBody>
-          <a:bodyPr/>
-          <a:lstStyle/>
-          <a:p>
-            <a:r>
-              <a:rPr lang="en-BE" dirty="0"/>
-              <a:t>Terminology</a:t>
-            </a:r>
-          </a:p>
-        </p:txBody>
-      </p:sp>
-      <p:sp>
-        <p:nvSpPr>
-          <p:cNvPr id="3" name="Slide Number Placeholder 2">
-            <a:extLst>
-              <a:ext uri="{FF2B5EF4-FFF2-40B4-BE49-F238E27FC236}">
-                <a16:creationId xmlns:a16="http://schemas.microsoft.com/office/drawing/2014/main" id="{E6FB7E31-8969-72F0-6E29-E2383B743067}"/>
-              </a:ext>
-            </a:extLst>
-          </p:cNvPr>
-          <p:cNvSpPr>
-            <a:spLocks noGrp="1"/>
-          </p:cNvSpPr>
-          <p:nvPr>
-            <p:ph type="sldNum" sz="quarter" idx="10"/>
-          </p:nvPr>
-        </p:nvSpPr>
-        <p:spPr/>
-        <p:txBody>
-          <a:bodyPr/>
-          <a:lstStyle/>
-          <a:p>
-            <a:fld id="{E038E271-308C-2E46-A3EC-56326F9084CC}" type="slidenum">
-              <a:rPr lang="nl-BE" smtClean="0"/>
-              <a:pPr/>
-              <a:t>5</a:t>
-            </a:fld>
-            <a:endParaRPr lang="nl-BE" dirty="0"/>
-          </a:p>
-        </p:txBody>
-      </p:sp>
-      <p:sp>
-        <p:nvSpPr>
-          <p:cNvPr id="4" name="Text Placeholder 3">
-            <a:extLst>
-              <a:ext uri="{FF2B5EF4-FFF2-40B4-BE49-F238E27FC236}">
-                <a16:creationId xmlns:a16="http://schemas.microsoft.com/office/drawing/2014/main" id="{D2790A8C-65A8-4879-07C5-DCEC2C459699}"/>
-              </a:ext>
-            </a:extLst>
-          </p:cNvPr>
-          <p:cNvSpPr>
-            <a:spLocks noGrp="1"/>
-          </p:cNvSpPr>
-          <p:nvPr>
-            <p:ph type="body" sz="quarter" idx="11"/>
-          </p:nvPr>
-        </p:nvSpPr>
-        <p:spPr>
-          <a:xfrm>
-            <a:off x="817792" y="4776787"/>
-            <a:ext cx="10162493" cy="1460500"/>
-          </a:xfrm>
-        </p:spPr>
-        <p:txBody>
-          <a:bodyPr>
-            <a:normAutofit fontScale="85000" lnSpcReduction="20000"/>
-          </a:bodyPr>
-          <a:lstStyle/>
-          <a:p>
-            <a:pPr>
-              <a:tabLst>
-                <a:tab pos="2616200" algn="l"/>
-              </a:tabLst>
-            </a:pPr>
-            <a:r>
-              <a:rPr lang="en-GB" dirty="0"/>
-              <a:t>C</a:t>
-            </a:r>
-            <a:r>
-              <a:rPr lang="en-BE" dirty="0"/>
-              <a:t>lassification: 	Find category of an object in an image</a:t>
-            </a:r>
-          </a:p>
-          <a:p>
-            <a:pPr>
-              <a:tabLst>
-                <a:tab pos="2616200" algn="l"/>
-              </a:tabLst>
-            </a:pPr>
-            <a:r>
-              <a:rPr lang="en-BE" dirty="0"/>
-              <a:t>Localization: 	Find where the object is and draw a box around it</a:t>
-            </a:r>
-          </a:p>
-          <a:p>
-            <a:pPr>
-              <a:tabLst>
-                <a:tab pos="2616200" algn="l"/>
-              </a:tabLst>
-            </a:pPr>
-            <a:r>
-              <a:rPr lang="en-BE" dirty="0"/>
-              <a:t>Object detection: 	Classify and detect all objects in an image</a:t>
-            </a:r>
-          </a:p>
-          <a:p>
-            <a:pPr>
-              <a:tabLst>
-                <a:tab pos="2616200" algn="l"/>
-              </a:tabLst>
-            </a:pPr>
-            <a:r>
-              <a:rPr lang="en-BE" dirty="0"/>
-              <a:t>Segmentation: 	Classify every pixel in an image </a:t>
-            </a:r>
-          </a:p>
-        </p:txBody>
-      </p:sp>
-      <p:sp>
-        <p:nvSpPr>
-          <p:cNvPr id="8" name="TextBox 7">
-            <a:extLst>
-              <a:ext uri="{FF2B5EF4-FFF2-40B4-BE49-F238E27FC236}">
-                <a16:creationId xmlns:a16="http://schemas.microsoft.com/office/drawing/2014/main" id="{5A449275-FBE8-9956-AC4F-4333130A8DFD}"/>
-              </a:ext>
-            </a:extLst>
-          </p:cNvPr>
-          <p:cNvSpPr txBox="1"/>
-          <p:nvPr/>
-        </p:nvSpPr>
-        <p:spPr>
-          <a:xfrm>
-            <a:off x="4305300" y="787400"/>
-            <a:ext cx="2374900" cy="244107"/>
-          </a:xfrm>
-          <a:prstGeom prst="rect">
-            <a:avLst/>
-          </a:prstGeom>
-          <a:noFill/>
-        </p:spPr>
-        <p:txBody>
-          <a:bodyPr wrap="square" lIns="0" tIns="0" rIns="0" bIns="0" rtlCol="0">
-            <a:noAutofit/>
-          </a:bodyPr>
-          <a:lstStyle/>
-          <a:p>
-            <a:pPr marL="0" indent="0" algn="ctr">
-              <a:buFont typeface="Arial" panose="020B0604020202020204" pitchFamily="34" charset="0"/>
-              <a:buNone/>
-            </a:pPr>
-            <a:r>
-              <a:rPr lang="en-BE" sz="2400" b="1" dirty="0">
-                <a:solidFill>
-                  <a:srgbClr val="A37A0E"/>
+                  <a:srgbClr val="C00000"/>
                 </a:solidFill>
                 <a:latin typeface="+mn-lt"/>
                 <a:ea typeface="Verdana" panose="020B0604030504040204" pitchFamily="34" charset="0"/>
                 <a:cs typeface="Verdana" panose="020B0604030504040204" pitchFamily="34" charset="0"/>
-              </a:rPr>
-              <a:t>Research area</a:t>
-            </a:r>
-          </a:p>
-        </p:txBody>
-      </p:sp>
+              </a:endParaRPr>
+            </a:p>
+          </p:txBody>
+        </p:sp>
+        <p:grpSp>
+          <p:nvGrpSpPr>
+            <p:cNvPr id="31" name="Group 30">
+              <a:extLst>
+                <a:ext uri="{FF2B5EF4-FFF2-40B4-BE49-F238E27FC236}">
+                  <a16:creationId xmlns:a16="http://schemas.microsoft.com/office/drawing/2014/main" id="{F1D1D6E3-BA2B-975F-FDC1-C32BF7CC6062}"/>
+                </a:ext>
+              </a:extLst>
+            </p:cNvPr>
+            <p:cNvGrpSpPr/>
+            <p:nvPr/>
+          </p:nvGrpSpPr>
+          <p:grpSpPr>
+            <a:xfrm>
+              <a:off x="4003158" y="3981590"/>
+              <a:ext cx="2583718" cy="1856226"/>
+              <a:chOff x="4003158" y="3981590"/>
+              <a:chExt cx="2583718" cy="1856226"/>
+            </a:xfrm>
+          </p:grpSpPr>
+          <p:sp>
+            <p:nvSpPr>
+              <p:cNvPr id="19" name="Right Brace 18">
+                <a:extLst>
+                  <a:ext uri="{FF2B5EF4-FFF2-40B4-BE49-F238E27FC236}">
+                    <a16:creationId xmlns:a16="http://schemas.microsoft.com/office/drawing/2014/main" id="{3AC5E5B3-79E6-A5A0-F24C-21A0B882076E}"/>
+                  </a:ext>
+                </a:extLst>
+              </p:cNvPr>
+              <p:cNvSpPr/>
+              <p:nvPr/>
+            </p:nvSpPr>
+            <p:spPr>
+              <a:xfrm rot="5400000" flipV="1">
+                <a:off x="5217295" y="4468235"/>
+                <a:ext cx="155448" cy="2583714"/>
+              </a:xfrm>
+              <a:prstGeom prst="rightBrace">
+                <a:avLst/>
+              </a:prstGeom>
+              <a:ln>
+                <a:solidFill>
+                  <a:srgbClr val="C00000"/>
+                </a:solidFill>
+                <a:headEnd type="none" w="med" len="med"/>
+                <a:tailEnd type="none" w="med" len="med"/>
+              </a:ln>
+              <a:effectLst/>
+            </p:spPr>
+            <p:style>
+              <a:lnRef idx="2">
+                <a:schemeClr val="accent1"/>
+              </a:lnRef>
+              <a:fillRef idx="0">
+                <a:schemeClr val="accent1"/>
+              </a:fillRef>
+              <a:effectRef idx="1">
+                <a:schemeClr val="accent1"/>
+              </a:effectRef>
+              <a:fontRef idx="minor">
+                <a:schemeClr val="tx1"/>
+              </a:fontRef>
+            </p:style>
+            <p:txBody>
+              <a:bodyPr rtlCol="0" anchor="ctr"/>
+              <a:lstStyle/>
+              <a:p>
+                <a:pPr algn="ctr"/>
+                <a:endParaRPr lang="en-BE"/>
+              </a:p>
+            </p:txBody>
+          </p:sp>
+          <p:cxnSp>
+            <p:nvCxnSpPr>
+              <p:cNvPr id="21" name="Straight Connector 20">
+                <a:extLst>
+                  <a:ext uri="{FF2B5EF4-FFF2-40B4-BE49-F238E27FC236}">
+                    <a16:creationId xmlns:a16="http://schemas.microsoft.com/office/drawing/2014/main" id="{95CEF720-C09A-6712-E246-E6C475D23936}"/>
+                  </a:ext>
+                </a:extLst>
+              </p:cNvPr>
+              <p:cNvCxnSpPr/>
+              <p:nvPr/>
+            </p:nvCxnSpPr>
+            <p:spPr>
+              <a:xfrm>
+                <a:off x="6586873" y="3981590"/>
+                <a:ext cx="0" cy="1658679"/>
+              </a:xfrm>
+              <a:prstGeom prst="line">
+                <a:avLst/>
+              </a:prstGeom>
+              <a:ln>
+                <a:solidFill>
+                  <a:srgbClr val="C00000"/>
+                </a:solidFill>
+                <a:prstDash val="sysDot"/>
+                <a:headEnd type="none" w="med" len="med"/>
+                <a:tailEnd type="none" w="med" len="med"/>
+              </a:ln>
+              <a:effectLst/>
+            </p:spPr>
+            <p:style>
+              <a:lnRef idx="2">
+                <a:schemeClr val="accent1"/>
+              </a:lnRef>
+              <a:fillRef idx="0">
+                <a:schemeClr val="accent1"/>
+              </a:fillRef>
+              <a:effectRef idx="1">
+                <a:schemeClr val="accent1"/>
+              </a:effectRef>
+              <a:fontRef idx="minor">
+                <a:schemeClr val="tx1"/>
+              </a:fontRef>
+            </p:style>
+          </p:cxnSp>
+          <p:cxnSp>
+            <p:nvCxnSpPr>
+              <p:cNvPr id="23" name="Straight Connector 22">
+                <a:extLst>
+                  <a:ext uri="{FF2B5EF4-FFF2-40B4-BE49-F238E27FC236}">
+                    <a16:creationId xmlns:a16="http://schemas.microsoft.com/office/drawing/2014/main" id="{0D587F43-2D13-4F42-7E6B-717FECE0B0B5}"/>
+                  </a:ext>
+                </a:extLst>
+              </p:cNvPr>
+              <p:cNvCxnSpPr/>
+              <p:nvPr/>
+            </p:nvCxnSpPr>
+            <p:spPr>
+              <a:xfrm>
+                <a:off x="4003158" y="3981590"/>
+                <a:ext cx="0" cy="1658679"/>
+              </a:xfrm>
+              <a:prstGeom prst="line">
+                <a:avLst/>
+              </a:prstGeom>
+              <a:ln>
+                <a:solidFill>
+                  <a:srgbClr val="C00000"/>
+                </a:solidFill>
+                <a:prstDash val="sysDot"/>
+                <a:headEnd type="none" w="med" len="med"/>
+                <a:tailEnd type="none" w="med" len="med"/>
+              </a:ln>
+              <a:effectLst/>
+            </p:spPr>
+            <p:style>
+              <a:lnRef idx="2">
+                <a:schemeClr val="accent1"/>
+              </a:lnRef>
+              <a:fillRef idx="0">
+                <a:schemeClr val="accent1"/>
+              </a:fillRef>
+              <a:effectRef idx="1">
+                <a:schemeClr val="accent1"/>
+              </a:effectRef>
+              <a:fontRef idx="minor">
+                <a:schemeClr val="tx1"/>
+              </a:fontRef>
+            </p:style>
+          </p:cxnSp>
+        </p:grpSp>
+      </p:grpSp>
+      <p:grpSp>
+        <p:nvGrpSpPr>
+          <p:cNvPr id="29" name="Group 28">
+            <a:extLst>
+              <a:ext uri="{FF2B5EF4-FFF2-40B4-BE49-F238E27FC236}">
+                <a16:creationId xmlns:a16="http://schemas.microsoft.com/office/drawing/2014/main" id="{9380170A-39D2-20C6-0874-6679B02B36C8}"/>
+              </a:ext>
+            </a:extLst>
+          </p:cNvPr>
+          <p:cNvGrpSpPr/>
+          <p:nvPr/>
+        </p:nvGrpSpPr>
+        <p:grpSpPr>
+          <a:xfrm>
+            <a:off x="4003157" y="3981590"/>
+            <a:ext cx="1887276" cy="1635432"/>
+            <a:chOff x="4003157" y="3981590"/>
+            <a:chExt cx="1887276" cy="1635432"/>
+          </a:xfrm>
+        </p:grpSpPr>
+        <p:sp>
+          <p:nvSpPr>
+            <p:cNvPr id="11" name="TextBox 10">
+              <a:extLst>
+                <a:ext uri="{FF2B5EF4-FFF2-40B4-BE49-F238E27FC236}">
+                  <a16:creationId xmlns:a16="http://schemas.microsoft.com/office/drawing/2014/main" id="{F23CD1B7-BFCE-67FF-B68B-F0DAFE307A2E}"/>
+                </a:ext>
+              </a:extLst>
+            </p:cNvPr>
+            <p:cNvSpPr txBox="1"/>
+            <p:nvPr/>
+          </p:nvSpPr>
+          <p:spPr>
+            <a:xfrm>
+              <a:off x="4519198" y="5340973"/>
+              <a:ext cx="855194" cy="276049"/>
+            </a:xfrm>
+            <a:prstGeom prst="rect">
+              <a:avLst/>
+            </a:prstGeom>
+            <a:noFill/>
+          </p:spPr>
+          <p:txBody>
+            <a:bodyPr wrap="square" lIns="0" tIns="0" rIns="0" bIns="0" rtlCol="0">
+              <a:noAutofit/>
+            </a:bodyPr>
+            <a:lstStyle/>
+            <a:p>
+              <a:pPr marL="0" indent="0" algn="ctr">
+                <a:buFont typeface="Arial" panose="020B0604020202020204" pitchFamily="34" charset="0"/>
+                <a:buNone/>
+              </a:pPr>
+              <a:r>
+                <a:rPr lang="en-US" sz="1600" b="1" dirty="0">
+                  <a:solidFill>
+                    <a:srgbClr val="002E65"/>
+                  </a:solidFill>
+                  <a:latin typeface="+mn-lt"/>
+                  <a:ea typeface="Verdana" panose="020B0604030504040204" pitchFamily="34" charset="0"/>
+                  <a:cs typeface="Verdana" panose="020B0604030504040204" pitchFamily="34" charset="0"/>
+                </a:rPr>
+                <a:t>WSOL</a:t>
+              </a:r>
+              <a:endParaRPr lang="en-BE" sz="1600" b="1" dirty="0">
+                <a:solidFill>
+                  <a:srgbClr val="002E65"/>
+                </a:solidFill>
+                <a:latin typeface="+mn-lt"/>
+                <a:ea typeface="Verdana" panose="020B0604030504040204" pitchFamily="34" charset="0"/>
+                <a:cs typeface="Verdana" panose="020B0604030504040204" pitchFamily="34" charset="0"/>
+              </a:endParaRPr>
+            </a:p>
+          </p:txBody>
+        </p:sp>
+        <p:grpSp>
+          <p:nvGrpSpPr>
+            <p:cNvPr id="28" name="Group 27">
+              <a:extLst>
+                <a:ext uri="{FF2B5EF4-FFF2-40B4-BE49-F238E27FC236}">
+                  <a16:creationId xmlns:a16="http://schemas.microsoft.com/office/drawing/2014/main" id="{989D0DB1-3FB6-A112-55F7-1AF164F1F213}"/>
+                </a:ext>
+              </a:extLst>
+            </p:cNvPr>
+            <p:cNvGrpSpPr/>
+            <p:nvPr/>
+          </p:nvGrpSpPr>
+          <p:grpSpPr>
+            <a:xfrm>
+              <a:off x="4003157" y="3981590"/>
+              <a:ext cx="1887276" cy="1345847"/>
+              <a:chOff x="4003157" y="3981590"/>
+              <a:chExt cx="1887276" cy="1345847"/>
+            </a:xfrm>
+          </p:grpSpPr>
+          <p:cxnSp>
+            <p:nvCxnSpPr>
+              <p:cNvPr id="24" name="Straight Connector 23">
+                <a:extLst>
+                  <a:ext uri="{FF2B5EF4-FFF2-40B4-BE49-F238E27FC236}">
+                    <a16:creationId xmlns:a16="http://schemas.microsoft.com/office/drawing/2014/main" id="{4F4AD049-3104-3516-7F08-52E741D5B378}"/>
+                  </a:ext>
+                </a:extLst>
+              </p:cNvPr>
+              <p:cNvCxnSpPr/>
+              <p:nvPr/>
+            </p:nvCxnSpPr>
+            <p:spPr>
+              <a:xfrm>
+                <a:off x="5890433" y="3981590"/>
+                <a:ext cx="0" cy="1148619"/>
+              </a:xfrm>
+              <a:prstGeom prst="line">
+                <a:avLst/>
+              </a:prstGeom>
+              <a:ln>
+                <a:solidFill>
+                  <a:srgbClr val="002E65"/>
+                </a:solidFill>
+                <a:prstDash val="sysDot"/>
+                <a:headEnd type="none" w="med" len="med"/>
+                <a:tailEnd type="none" w="med" len="med"/>
+              </a:ln>
+              <a:effectLst/>
+            </p:spPr>
+            <p:style>
+              <a:lnRef idx="2">
+                <a:schemeClr val="accent1"/>
+              </a:lnRef>
+              <a:fillRef idx="0">
+                <a:schemeClr val="accent1"/>
+              </a:fillRef>
+              <a:effectRef idx="1">
+                <a:schemeClr val="accent1"/>
+              </a:effectRef>
+              <a:fontRef idx="minor">
+                <a:schemeClr val="tx1"/>
+              </a:fontRef>
+            </p:style>
+          </p:cxnSp>
+          <p:cxnSp>
+            <p:nvCxnSpPr>
+              <p:cNvPr id="27" name="Straight Connector 26">
+                <a:extLst>
+                  <a:ext uri="{FF2B5EF4-FFF2-40B4-BE49-F238E27FC236}">
+                    <a16:creationId xmlns:a16="http://schemas.microsoft.com/office/drawing/2014/main" id="{923CC6DB-C203-0929-01AA-5EA1FBD92ABB}"/>
+                  </a:ext>
+                </a:extLst>
+              </p:cNvPr>
+              <p:cNvCxnSpPr/>
+              <p:nvPr/>
+            </p:nvCxnSpPr>
+            <p:spPr>
+              <a:xfrm>
+                <a:off x="4003158" y="3981590"/>
+                <a:ext cx="0" cy="1148619"/>
+              </a:xfrm>
+              <a:prstGeom prst="line">
+                <a:avLst/>
+              </a:prstGeom>
+              <a:ln>
+                <a:solidFill>
+                  <a:srgbClr val="002E65"/>
+                </a:solidFill>
+                <a:prstDash val="sysDot"/>
+                <a:headEnd type="none" w="med" len="med"/>
+                <a:tailEnd type="none" w="med" len="med"/>
+              </a:ln>
+              <a:effectLst/>
+            </p:spPr>
+            <p:style>
+              <a:lnRef idx="2">
+                <a:schemeClr val="accent1"/>
+              </a:lnRef>
+              <a:fillRef idx="0">
+                <a:schemeClr val="accent1"/>
+              </a:fillRef>
+              <a:effectRef idx="1">
+                <a:schemeClr val="accent1"/>
+              </a:effectRef>
+              <a:fontRef idx="minor">
+                <a:schemeClr val="tx1"/>
+              </a:fontRef>
+            </p:style>
+          </p:cxnSp>
+          <p:sp>
+            <p:nvSpPr>
+              <p:cNvPr id="15" name="Right Brace 14">
+                <a:extLst>
+                  <a:ext uri="{FF2B5EF4-FFF2-40B4-BE49-F238E27FC236}">
+                    <a16:creationId xmlns:a16="http://schemas.microsoft.com/office/drawing/2014/main" id="{E0AEE349-933F-B2D6-8FBA-13FC3A59518D}"/>
+                  </a:ext>
+                </a:extLst>
+              </p:cNvPr>
+              <p:cNvSpPr/>
+              <p:nvPr/>
+            </p:nvSpPr>
+            <p:spPr>
+              <a:xfrm rot="5400000" flipV="1">
+                <a:off x="4869071" y="4306075"/>
+                <a:ext cx="155448" cy="1887275"/>
+              </a:xfrm>
+              <a:prstGeom prst="rightBrace">
+                <a:avLst/>
+              </a:prstGeom>
+              <a:ln>
+                <a:headEnd type="none" w="med" len="med"/>
+                <a:tailEnd type="none" w="med" len="med"/>
+              </a:ln>
+              <a:effectLst/>
+            </p:spPr>
+            <p:style>
+              <a:lnRef idx="2">
+                <a:schemeClr val="accent1"/>
+              </a:lnRef>
+              <a:fillRef idx="0">
+                <a:schemeClr val="accent1"/>
+              </a:fillRef>
+              <a:effectRef idx="1">
+                <a:schemeClr val="accent1"/>
+              </a:effectRef>
+              <a:fontRef idx="minor">
+                <a:schemeClr val="tx1"/>
+              </a:fontRef>
+            </p:style>
+            <p:txBody>
+              <a:bodyPr rtlCol="0" anchor="ctr"/>
+              <a:lstStyle/>
+              <a:p>
+                <a:pPr algn="ctr"/>
+                <a:endParaRPr lang="en-BE"/>
+              </a:p>
+            </p:txBody>
+          </p:sp>
+        </p:grpSp>
+      </p:grpSp>
     </p:spTree>
     <p:extLst>
       <p:ext uri="{BB962C8B-B14F-4D97-AF65-F5344CB8AC3E}">
@@ -11185,6 +11882,126 @@
   <p:clrMapOvr>
     <a:masterClrMapping/>
   </p:clrMapOvr>
+  <p:timing>
+    <p:tnLst>
+      <p:par>
+        <p:cTn id="1" dur="indefinite" restart="never" nodeType="tmRoot">
+          <p:childTnLst>
+            <p:seq concurrent="1" nextAc="seek">
+              <p:cTn id="2" dur="indefinite" nodeType="mainSeq">
+                <p:childTnLst>
+                  <p:par>
+                    <p:cTn id="3" fill="hold">
+                      <p:stCondLst>
+                        <p:cond delay="indefinite"/>
+                      </p:stCondLst>
+                      <p:childTnLst>
+                        <p:par>
+                          <p:cTn id="4" fill="hold">
+                            <p:stCondLst>
+                              <p:cond delay="0"/>
+                            </p:stCondLst>
+                            <p:childTnLst>
+                              <p:par>
+                                <p:cTn id="5" presetID="1" presetClass="entr" presetSubtype="0" fill="hold" nodeType="clickEffect">
+                                  <p:stCondLst>
+                                    <p:cond delay="0"/>
+                                  </p:stCondLst>
+                                  <p:childTnLst>
+                                    <p:set>
+                                      <p:cBhvr>
+                                        <p:cTn id="6" dur="1" fill="hold">
+                                          <p:stCondLst>
+                                            <p:cond delay="0"/>
+                                          </p:stCondLst>
+                                        </p:cTn>
+                                        <p:tgtEl>
+                                          <p:spTgt spid="29"/>
+                                        </p:tgtEl>
+                                        <p:attrNameLst>
+                                          <p:attrName>style.visibility</p:attrName>
+                                        </p:attrNameLst>
+                                      </p:cBhvr>
+                                      <p:to>
+                                        <p:strVal val="visible"/>
+                                      </p:to>
+                                    </p:set>
+                                  </p:childTnLst>
+                                </p:cTn>
+                              </p:par>
+                            </p:childTnLst>
+                          </p:cTn>
+                        </p:par>
+                      </p:childTnLst>
+                    </p:cTn>
+                  </p:par>
+                  <p:par>
+                    <p:cTn id="7" fill="hold">
+                      <p:stCondLst>
+                        <p:cond delay="indefinite"/>
+                      </p:stCondLst>
+                      <p:childTnLst>
+                        <p:par>
+                          <p:cTn id="8" fill="hold">
+                            <p:stCondLst>
+                              <p:cond delay="0"/>
+                            </p:stCondLst>
+                            <p:childTnLst>
+                              <p:par>
+                                <p:cTn id="9" presetID="1" presetClass="entr" presetSubtype="0" fill="hold" nodeType="clickEffect">
+                                  <p:stCondLst>
+                                    <p:cond delay="0"/>
+                                  </p:stCondLst>
+                                  <p:childTnLst>
+                                    <p:set>
+                                      <p:cBhvr>
+                                        <p:cTn id="10" dur="1" fill="hold">
+                                          <p:stCondLst>
+                                            <p:cond delay="0"/>
+                                          </p:stCondLst>
+                                        </p:cTn>
+                                        <p:tgtEl>
+                                          <p:spTgt spid="32"/>
+                                        </p:tgtEl>
+                                        <p:attrNameLst>
+                                          <p:attrName>style.visibility</p:attrName>
+                                        </p:attrNameLst>
+                                      </p:cBhvr>
+                                      <p:to>
+                                        <p:strVal val="visible"/>
+                                      </p:to>
+                                    </p:set>
+                                  </p:childTnLst>
+                                </p:cTn>
+                              </p:par>
+                            </p:childTnLst>
+                          </p:cTn>
+                        </p:par>
+                      </p:childTnLst>
+                    </p:cTn>
+                  </p:par>
+                </p:childTnLst>
+              </p:cTn>
+              <p:prevCondLst>
+                <p:cond evt="onPrev" delay="0">
+                  <p:tgtEl>
+                    <p:sldTgt/>
+                  </p:tgtEl>
+                </p:cond>
+              </p:prevCondLst>
+              <p:nextCondLst>
+                <p:cond evt="onNext" delay="0">
+                  <p:tgtEl>
+                    <p:sldTgt/>
+                  </p:tgtEl>
+                </p:cond>
+              </p:nextCondLst>
+            </p:seq>
+          </p:childTnLst>
+        </p:cTn>
+      </p:par>
+    </p:tnLst>
+  </p:timing>
 </p:sld>
 </file>
 
@@ -11228,7 +12045,7 @@
           <a:p>
             <a:r>
               <a:rPr lang="en-BE" dirty="0"/>
-              <a:t>Object detection</a:t>
+              <a:t>Why WSOL?</a:t>
             </a:r>
           </a:p>
         </p:txBody>
@@ -11286,49 +12103,71 @@
           </a:bodyPr>
           <a:lstStyle/>
           <a:p>
-            <a:r>
-              <a:rPr lang="en-BE" dirty="0"/>
-              <a:t>Task: classification and localization of all objects in images</a:t>
-            </a:r>
-          </a:p>
-          <a:p>
-            <a:r>
-              <a:rPr lang="en-BE" dirty="0"/>
-              <a:t>Deep learning models achieve great performance, but…</a:t>
-            </a:r>
-          </a:p>
-          <a:p>
+            <a:pPr marL="0" indent="0">
+              <a:buNone/>
+            </a:pPr>
             <a:r>
               <a:rPr lang="en-GB" dirty="0"/>
-              <a:t>Training models requires costly human labelling:</a:t>
-            </a:r>
-          </a:p>
-          <a:p>
-            <a:pPr lvl="1"/>
+              <a:t>Problem </a:t>
+            </a:r>
+          </a:p>
+          <a:p>
             <a:r>
               <a:rPr lang="en-GB" dirty="0"/>
-              <a:t>Class label for each object in images</a:t>
-            </a:r>
-          </a:p>
-          <a:p>
-            <a:pPr lvl="1"/>
+              <a:t>Object detection achieves great performance, but …</a:t>
+            </a:r>
+          </a:p>
+          <a:p>
             <a:r>
               <a:rPr lang="en-GB" dirty="0"/>
-              <a:t>Bounding box for each object in images</a:t>
-            </a:r>
-          </a:p>
-          <a:p>
-            <a:pPr marL="360362" lvl="1" indent="0">
+              <a:t>… Requires costly human labelling of bounding boxes</a:t>
+            </a:r>
+          </a:p>
+          <a:p>
+            <a:r>
+              <a:rPr lang="en-GB" dirty="0"/>
+              <a:t>Localization labels not always available or of poor quality</a:t>
+            </a:r>
+          </a:p>
+          <a:p>
+            <a:pPr marL="0" indent="0">
               <a:buNone/>
             </a:pPr>
             <a:endParaRPr lang="en-GB" dirty="0"/>
           </a:p>
+          <a:p>
+            <a:pPr marL="0" indent="0">
+              <a:buNone/>
+            </a:pPr>
+            <a:r>
+              <a:rPr lang="en-GB" dirty="0"/>
+              <a:t>Solution</a:t>
+            </a:r>
+          </a:p>
+          <a:p>
+            <a:r>
+              <a:rPr lang="en-GB" dirty="0"/>
+              <a:t>Weakly supervised: Only image-level labels are used to train model </a:t>
+            </a:r>
+          </a:p>
+          <a:p>
+            <a:r>
+              <a:rPr lang="en-GB" dirty="0"/>
+              <a:t>Object localization based on learned features</a:t>
+            </a:r>
+          </a:p>
+          <a:p>
+            <a:pPr marL="0" indent="0">
+              <a:buNone/>
+            </a:pPr>
+            <a:endParaRPr lang="en-GB" dirty="0"/>
+          </a:p>
         </p:txBody>
       </p:sp>
     </p:spTree>
     <p:extLst>
       <p:ext uri="{BB962C8B-B14F-4D97-AF65-F5344CB8AC3E}">
-        <p14:creationId xmlns:p14="http://schemas.microsoft.com/office/powerpoint/2010/main" val="4211421336"/>
+        <p14:creationId xmlns:p14="http://schemas.microsoft.com/office/powerpoint/2010/main" val="2908672348"/>
       </p:ext>
     </p:extLst>
   </p:cSld>
@@ -11378,7 +12217,7 @@
           <a:p>
             <a:r>
               <a:rPr lang="en-BE" dirty="0"/>
-              <a:t>Weakly supervised object localization (WSOL)</a:t>
+              <a:t>WSOL prior-art (deep learning)</a:t>
             </a:r>
           </a:p>
         </p:txBody>
@@ -11432,53 +12271,115 @@
         <p:spPr/>
         <p:txBody>
           <a:bodyPr>
-            <a:normAutofit/>
+            <a:normAutofit fontScale="92500" lnSpcReduction="20000"/>
           </a:bodyPr>
           <a:lstStyle/>
           <a:p>
+            <a:pPr marL="0" indent="0">
+              <a:buNone/>
+            </a:pPr>
             <a:r>
               <a:rPr lang="en-GB" dirty="0"/>
-              <a:t>Task: Classification of </a:t>
-            </a:r>
-            <a:r>
-              <a:rPr lang="en-GB" b="1" dirty="0"/>
-              <a:t>1 single object </a:t>
-            </a:r>
+              <a:t>Class Activation Mapping (CAM) </a:t>
+            </a:r>
+          </a:p>
+          <a:p>
             <a:r>
               <a:rPr lang="en-GB" dirty="0"/>
-              <a:t>in images</a:t>
+              <a:t>Baseline deep learning method of WSOL</a:t>
             </a:r>
           </a:p>
           <a:p>
             <a:r>
               <a:rPr lang="en-GB" dirty="0"/>
-              <a:t>Requires only image-level labels</a:t>
+              <a:t>Uses feature activations to localize objects</a:t>
             </a:r>
           </a:p>
           <a:p>
             <a:r>
               <a:rPr lang="en-GB" dirty="0"/>
-              <a:t> Important class of WSOL methods: Class Activation Mapping (CAM) </a:t>
+              <a:t>Limitations</a:t>
             </a:r>
           </a:p>
           <a:p>
             <a:pPr lvl="1"/>
             <a:r>
               <a:rPr lang="en-GB" dirty="0"/>
-              <a:t>Localization using classifier activations for most discriminative parts of object</a:t>
+              <a:t>Focus on discriminative parts of object: Object partly localized</a:t>
             </a:r>
           </a:p>
           <a:p>
             <a:pPr lvl="1"/>
             <a:r>
               <a:rPr lang="en-GB" dirty="0"/>
-              <a:t>Vast area of research to improve on limitations</a:t>
-            </a:r>
-          </a:p>
-          <a:p>
+              <a:t>Parts in background may activate and be recognized as object</a:t>
+            </a:r>
+          </a:p>
+          <a:p>
+            <a:pPr marL="0" indent="0">
+              <a:buNone/>
+            </a:pPr>
+            <a:endParaRPr lang="en-GB" dirty="0"/>
+          </a:p>
+          <a:p>
+            <a:pPr marL="0" indent="0">
+              <a:buNone/>
+            </a:pPr>
             <a:r>
               <a:rPr lang="en-GB" dirty="0"/>
-              <a:t>What about multiple objects in image?</a:t>
+              <a:t>CAM research</a:t>
+            </a:r>
+          </a:p>
+          <a:p>
+            <a:pPr lvl="1"/>
+            <a:r>
+              <a:rPr lang="en-GB" dirty="0"/>
+              <a:t>Use other techniques to overcome limitations</a:t>
+            </a:r>
+          </a:p>
+          <a:p>
+            <a:pPr lvl="1"/>
+            <a:r>
+              <a:rPr lang="en-GB" dirty="0"/>
+              <a:t>E.g. region regularization (</a:t>
+            </a:r>
+            <a:r>
+              <a:rPr lang="en-GB" dirty="0" err="1"/>
+              <a:t>MinMaxCAM</a:t>
+            </a:r>
+            <a:r>
+              <a:rPr lang="en-GB" dirty="0"/>
+              <a:t>), gradient-weighted CAM (</a:t>
+            </a:r>
+            <a:r>
+              <a:rPr lang="en-GB" dirty="0" err="1"/>
+              <a:t>GradCAM</a:t>
+            </a:r>
+            <a:r>
+              <a:rPr lang="en-GB" dirty="0"/>
+              <a:t>), score-weighted CAM (</a:t>
+            </a:r>
+            <a:r>
+              <a:rPr lang="en-GB" dirty="0" err="1"/>
+              <a:t>ScoreCAM</a:t>
+            </a:r>
+            <a:r>
+              <a:rPr lang="en-GB" dirty="0"/>
+              <a:t>). </a:t>
+            </a:r>
+          </a:p>
+          <a:p>
+            <a:pPr lvl="1"/>
+            <a:r>
+              <a:rPr lang="en-GB" dirty="0"/>
+              <a:t>More than 70 papers</a:t>
+            </a:r>
+          </a:p>
+          <a:p>
+            <a:pPr lvl="1"/>
+            <a:r>
+              <a:rPr lang="en-GB" dirty="0"/>
+              <a:t>Multi-instance WSOL is not addressed!</a:t>
             </a:r>
           </a:p>
         </p:txBody>
@@ -11486,7 +12387,7 @@
     </p:spTree>
     <p:extLst>
       <p:ext uri="{BB962C8B-B14F-4D97-AF65-F5344CB8AC3E}">
-        <p14:creationId xmlns:p14="http://schemas.microsoft.com/office/powerpoint/2010/main" val="2908672348"/>
+        <p14:creationId xmlns:p14="http://schemas.microsoft.com/office/powerpoint/2010/main" val="3198382193"/>
       </p:ext>
     </p:extLst>
   </p:cSld>
@@ -11518,7 +12419,7 @@
           <p:cNvPr id="2" name="Title 1">
             <a:extLst>
               <a:ext uri="{FF2B5EF4-FFF2-40B4-BE49-F238E27FC236}">
-                <a16:creationId xmlns:a16="http://schemas.microsoft.com/office/drawing/2014/main" id="{A48FCAB0-376A-197E-8234-B626114DAC5E}"/>
+                <a16:creationId xmlns:a16="http://schemas.microsoft.com/office/drawing/2014/main" id="{43A5CB1D-8739-066A-C5B7-033434739CE0}"/>
               </a:ext>
             </a:extLst>
           </p:cNvPr>
@@ -11536,7 +12437,7 @@
           <a:p>
             <a:r>
               <a:rPr lang="en-BE" dirty="0"/>
-              <a:t>Research question</a:t>
+              <a:t>Why multiple-instance WSOL? </a:t>
             </a:r>
           </a:p>
         </p:txBody>
@@ -11546,7 +12447,7 @@
           <p:cNvPr id="3" name="Slide Number Placeholder 2">
             <a:extLst>
               <a:ext uri="{FF2B5EF4-FFF2-40B4-BE49-F238E27FC236}">
-                <a16:creationId xmlns:a16="http://schemas.microsoft.com/office/drawing/2014/main" id="{DCB89308-61E1-BDB6-8F74-26141CE13F6F}"/>
+                <a16:creationId xmlns:a16="http://schemas.microsoft.com/office/drawing/2014/main" id="{04D60DEF-F915-C0F0-E4F9-2F60EA6071D1}"/>
               </a:ext>
             </a:extLst>
           </p:cNvPr>
@@ -11576,7 +12477,7 @@
           <p:cNvPr id="4" name="Text Placeholder 3">
             <a:extLst>
               <a:ext uri="{FF2B5EF4-FFF2-40B4-BE49-F238E27FC236}">
-                <a16:creationId xmlns:a16="http://schemas.microsoft.com/office/drawing/2014/main" id="{317A35C5-C1C2-A46C-AE21-73158890BEB1}"/>
+                <a16:creationId xmlns:a16="http://schemas.microsoft.com/office/drawing/2014/main" id="{8FA195E2-18A4-803F-27D7-47F8957C053B}"/>
               </a:ext>
             </a:extLst>
           </p:cNvPr>
@@ -11594,69 +12495,17 @@
           </a:bodyPr>
           <a:lstStyle/>
           <a:p>
-            <a:r>
-              <a:rPr lang="en-GB" dirty="0"/>
-              <a:t>Can we use CAM WSOL to localize multiple objects of the same class?</a:t>
-            </a:r>
-          </a:p>
-          <a:p>
-            <a:r>
-              <a:rPr lang="en-GB" dirty="0"/>
-              <a:t>Prior CAM research </a:t>
-            </a:r>
-          </a:p>
-          <a:p>
-            <a:pPr lvl="1"/>
-            <a:r>
-              <a:rPr lang="en-GB" dirty="0"/>
-              <a:t>focused on improving single-instance localization</a:t>
-            </a:r>
-          </a:p>
-          <a:p>
-            <a:pPr lvl="1"/>
-            <a:r>
-              <a:rPr lang="en-GB" dirty="0"/>
-              <a:t>No known prior research to detect more than 1 object</a:t>
-            </a:r>
-          </a:p>
-          <a:p>
-            <a:r>
-              <a:rPr lang="en-GB" dirty="0"/>
-              <a:t>This research</a:t>
-            </a:r>
-          </a:p>
-          <a:p>
-            <a:pPr lvl="1"/>
-            <a:r>
-              <a:rPr lang="en-GB" dirty="0"/>
-              <a:t>Define new evaluation method for multiple-instance WSOL</a:t>
-            </a:r>
-          </a:p>
-          <a:p>
-            <a:pPr lvl="1"/>
-            <a:r>
-              <a:rPr lang="en-GB" dirty="0"/>
-              <a:t>Benchmark new metrics on existing CAM methods</a:t>
-            </a:r>
-          </a:p>
-          <a:p>
-            <a:pPr lvl="1"/>
-            <a:r>
-              <a:rPr lang="en-GB" dirty="0"/>
-              <a:t>Find improvements for multiple </a:t>
-            </a:r>
-            <a:r>
-              <a:rPr lang="en-GB"/>
-              <a:t>instance localization</a:t>
-            </a:r>
-            <a:endParaRPr lang="en-GB" dirty="0"/>
+            <a:pPr marL="0" indent="0">
+              <a:buNone/>
+            </a:pPr>
+            <a:endParaRPr lang="en-BE" sz="3600" dirty="0"/>
           </a:p>
         </p:txBody>
       </p:sp>
     </p:spTree>
     <p:extLst>
       <p:ext uri="{BB962C8B-B14F-4D97-AF65-F5344CB8AC3E}">
-        <p14:creationId xmlns:p14="http://schemas.microsoft.com/office/powerpoint/2010/main" val="2278143303"/>
+        <p14:creationId xmlns:p14="http://schemas.microsoft.com/office/powerpoint/2010/main" val="3212442971"/>
       </p:ext>
     </p:extLst>
   </p:cSld>
@@ -11688,7 +12537,7 @@
           <p:cNvPr id="2" name="Title 1">
             <a:extLst>
               <a:ext uri="{FF2B5EF4-FFF2-40B4-BE49-F238E27FC236}">
-                <a16:creationId xmlns:a16="http://schemas.microsoft.com/office/drawing/2014/main" id="{BA529C6E-45F6-EC47-9E62-697FE893C136}"/>
+                <a16:creationId xmlns:a16="http://schemas.microsoft.com/office/drawing/2014/main" id="{A48FCAB0-376A-197E-8234-B626114DAC5E}"/>
               </a:ext>
             </a:extLst>
           </p:cNvPr>
@@ -11705,26 +12554,26 @@
           <a:lstStyle/>
           <a:p>
             <a:r>
-              <a:rPr lang="en-US" noProof="0" dirty="0"/>
-              <a:t>Method</a:t>
-            </a:r>
-          </a:p>
-        </p:txBody>
-      </p:sp>
-      <p:sp>
-        <p:nvSpPr>
-          <p:cNvPr id="3" name="Text Placeholder 2">
-            <a:extLst>
-              <a:ext uri="{FF2B5EF4-FFF2-40B4-BE49-F238E27FC236}">
-                <a16:creationId xmlns:a16="http://schemas.microsoft.com/office/drawing/2014/main" id="{AB02AE85-0D8F-2941-B863-417E24478159}"/>
-              </a:ext>
-            </a:extLst>
-          </p:cNvPr>
-          <p:cNvSpPr>
-            <a:spLocks noGrp="1"/>
-          </p:cNvSpPr>
-          <p:nvPr>
-            <p:ph type="body" sz="quarter" idx="10"/>
+              <a:rPr lang="en-BE" dirty="0"/>
+              <a:t>Research question</a:t>
+            </a:r>
+          </a:p>
+        </p:txBody>
+      </p:sp>
+      <p:sp>
+        <p:nvSpPr>
+          <p:cNvPr id="3" name="Slide Number Placeholder 2">
+            <a:extLst>
+              <a:ext uri="{FF2B5EF4-FFF2-40B4-BE49-F238E27FC236}">
+                <a16:creationId xmlns:a16="http://schemas.microsoft.com/office/drawing/2014/main" id="{DCB89308-61E1-BDB6-8F74-26141CE13F6F}"/>
+              </a:ext>
+            </a:extLst>
+          </p:cNvPr>
+          <p:cNvSpPr>
+            <a:spLocks noGrp="1"/>
+          </p:cNvSpPr>
+          <p:nvPr>
+            <p:ph type="sldNum" sz="quarter" idx="10"/>
           </p:nvPr>
         </p:nvSpPr>
         <p:spPr/>
@@ -11732,14 +12581,101 @@
           <a:bodyPr/>
           <a:lstStyle/>
           <a:p>
-            <a:endParaRPr lang="en-US" dirty="0"/>
+            <a:fld id="{E038E271-308C-2E46-A3EC-56326F9084CC}" type="slidenum">
+              <a:rPr lang="nl-BE" smtClean="0"/>
+              <a:pPr/>
+              <a:t>9</a:t>
+            </a:fld>
+            <a:endParaRPr lang="nl-BE" dirty="0"/>
+          </a:p>
+        </p:txBody>
+      </p:sp>
+      <p:sp>
+        <p:nvSpPr>
+          <p:cNvPr id="4" name="Text Placeholder 3">
+            <a:extLst>
+              <a:ext uri="{FF2B5EF4-FFF2-40B4-BE49-F238E27FC236}">
+                <a16:creationId xmlns:a16="http://schemas.microsoft.com/office/drawing/2014/main" id="{317A35C5-C1C2-A46C-AE21-73158890BEB1}"/>
+              </a:ext>
+            </a:extLst>
+          </p:cNvPr>
+          <p:cNvSpPr>
+            <a:spLocks noGrp="1"/>
+          </p:cNvSpPr>
+          <p:nvPr>
+            <p:ph type="body" sz="quarter" idx="11"/>
+          </p:nvPr>
+        </p:nvSpPr>
+        <p:spPr/>
+        <p:txBody>
+          <a:bodyPr>
+            <a:normAutofit/>
+          </a:bodyPr>
+          <a:lstStyle/>
+          <a:p>
+            <a:r>
+              <a:rPr lang="en-GB" dirty="0"/>
+              <a:t>Can we use CAM WSOL to localize multiple objects of the same class?</a:t>
+            </a:r>
+          </a:p>
+          <a:p>
+            <a:r>
+              <a:rPr lang="en-GB" dirty="0"/>
+              <a:t>Prior CAM research </a:t>
+            </a:r>
+          </a:p>
+          <a:p>
+            <a:pPr lvl="1"/>
+            <a:r>
+              <a:rPr lang="en-GB" dirty="0"/>
+              <a:t>focused on improving single-instance localization</a:t>
+            </a:r>
+          </a:p>
+          <a:p>
+            <a:pPr lvl="1"/>
+            <a:r>
+              <a:rPr lang="en-GB" dirty="0"/>
+              <a:t>No known prior research to detect more than 1 object</a:t>
+            </a:r>
+          </a:p>
+          <a:p>
+            <a:r>
+              <a:rPr lang="en-GB" dirty="0"/>
+              <a:t>This research</a:t>
+            </a:r>
+          </a:p>
+          <a:p>
+            <a:pPr lvl="1"/>
+            <a:r>
+              <a:rPr lang="en-GB" dirty="0"/>
+              <a:t>Define new evaluation method for multiple-instance WSOL</a:t>
+            </a:r>
+          </a:p>
+          <a:p>
+            <a:pPr lvl="1"/>
+            <a:r>
+              <a:rPr lang="en-GB" dirty="0"/>
+              <a:t>Benchmark new metrics on existing CAM methods</a:t>
+            </a:r>
+          </a:p>
+          <a:p>
+            <a:pPr lvl="1"/>
+            <a:r>
+              <a:rPr lang="en-GB" dirty="0"/>
+              <a:t>Find improvements for multiple </a:t>
+            </a:r>
+            <a:r>
+              <a:rPr lang="en-GB"/>
+              <a:t>instance localization</a:t>
+            </a:r>
+            <a:endParaRPr lang="en-GB" dirty="0"/>
           </a:p>
         </p:txBody>
       </p:sp>
     </p:spTree>
     <p:extLst>
       <p:ext uri="{BB962C8B-B14F-4D97-AF65-F5344CB8AC3E}">
-        <p14:creationId xmlns:p14="http://schemas.microsoft.com/office/powerpoint/2010/main" val="3550223122"/>
+        <p14:creationId xmlns:p14="http://schemas.microsoft.com/office/powerpoint/2010/main" val="2278143303"/>
       </p:ext>
     </p:extLst>
   </p:cSld>
@@ -12748,21 +13684,12 @@
 </file>
 
 <file path=customXml/item1.xml><?xml version="1.0" encoding="utf-8"?>
-<?mso-contentType ?>
-<FormTemplates xmlns="http://schemas.microsoft.com/sharepoint/v3/contenttype/forms">
-  <Display>DocumentLibraryForm</Display>
-  <Edit>DocumentLibraryForm</Edit>
-  <New>DocumentLibraryForm</New>
-</FormTemplates>
-</file>
-
-<file path=customXml/item2.xml><?xml version="1.0" encoding="utf-8"?>
 <p:properties xmlns:p="http://schemas.microsoft.com/office/2006/metadata/properties" xmlns:xsi="http://www.w3.org/2001/XMLSchema-instance" xmlns:pc="http://schemas.microsoft.com/office/infopath/2007/PartnerControls">
   <documentManagement/>
 </p:properties>
 </file>
 
-<file path=customXml/item3.xml><?xml version="1.0" encoding="utf-8"?>
+<file path=customXml/item2.xml><?xml version="1.0" encoding="utf-8"?>
 <ct:contentTypeSchema xmlns:ct="http://schemas.microsoft.com/office/2006/metadata/contentType" xmlns:ma="http://schemas.microsoft.com/office/2006/metadata/properties/metaAttributes" ct:_="" ma:_="" ma:contentTypeName="Document" ma:contentTypeID="0x010100707C9875C091B247AB9617006510CC43" ma:contentTypeVersion="9" ma:contentTypeDescription="Een nieuw document maken." ma:contentTypeScope="" ma:versionID="6792b0d8b1b497ec7b6f2fc518ad6b71">
   <xsd:schema xmlns:xsd="http://www.w3.org/2001/XMLSchema" xmlns:xs="http://www.w3.org/2001/XMLSchema" xmlns:p="http://schemas.microsoft.com/office/2006/metadata/properties" xmlns:ns2="a09e4e9c-009f-4841-8876-57cddbde6e17" xmlns:ns3="e4e19ae9-58fe-4993-a35b-a8a84bb511ff" targetNamespace="http://schemas.microsoft.com/office/2006/metadata/properties" ma:root="true" ma:fieldsID="4e3ada4487ef8e46945618bd17b59294" ns2:_="" ns3:_="">
     <xsd:import namespace="a09e4e9c-009f-4841-8876-57cddbde6e17"/>
@@ -12959,15 +13886,16 @@
 </ct:contentTypeSchema>
 </file>
 
-<file path=customXml/itemProps1.xml><?xml version="1.0" encoding="utf-8"?>
-<ds:datastoreItem xmlns:ds="http://schemas.openxmlformats.org/officeDocument/2006/customXml" ds:itemID="{5D6EDECA-2FC6-4CC6-BF57-774C7A66E703}">
-  <ds:schemaRefs>
-    <ds:schemaRef ds:uri="http://schemas.microsoft.com/sharepoint/v3/contenttype/forms"/>
-  </ds:schemaRefs>
-</ds:datastoreItem>
+<file path=customXml/item3.xml><?xml version="1.0" encoding="utf-8"?>
+<?mso-contentType ?>
+<FormTemplates xmlns="http://schemas.microsoft.com/sharepoint/v3/contenttype/forms">
+  <Display>DocumentLibraryForm</Display>
+  <Edit>DocumentLibraryForm</Edit>
+  <New>DocumentLibraryForm</New>
+</FormTemplates>
 </file>
 
-<file path=customXml/itemProps2.xml><?xml version="1.0" encoding="utf-8"?>
+<file path=customXml/itemProps1.xml><?xml version="1.0" encoding="utf-8"?>
 <ds:datastoreItem xmlns:ds="http://schemas.openxmlformats.org/officeDocument/2006/customXml" ds:itemID="{A5A93269-0A2D-4449-AFE7-E8570D6EC4CB}">
   <ds:schemaRefs>
     <ds:schemaRef ds:uri="http://schemas.microsoft.com/office/2006/metadata/properties"/>
@@ -12976,7 +13904,7 @@
 </ds:datastoreItem>
 </file>
 
-<file path=customXml/itemProps3.xml><?xml version="1.0" encoding="utf-8"?>
+<file path=customXml/itemProps2.xml><?xml version="1.0" encoding="utf-8"?>
 <ds:datastoreItem xmlns:ds="http://schemas.openxmlformats.org/officeDocument/2006/customXml" ds:itemID="{54449BF5-F7E1-46D5-B581-A176D4426B3C}">
   <ds:schemaRefs>
     <ds:schemaRef ds:uri="http://schemas.microsoft.com/office/2006/metadata/contentType"/>
@@ -12993,4 +13921,12 @@
     <ds:schemaRef ds:uri="http://schemas.microsoft.com/internal/obd"/>
   </ds:schemaRefs>
 </ds:datastoreItem>
+</file>
+
+<file path=customXml/itemProps3.xml><?xml version="1.0" encoding="utf-8"?>
+<ds:datastoreItem xmlns:ds="http://schemas.openxmlformats.org/officeDocument/2006/customXml" ds:itemID="{5D6EDECA-2FC6-4CC6-BF57-774C7A66E703}">
+  <ds:schemaRefs>
+    <ds:schemaRef ds:uri="http://schemas.microsoft.com/sharepoint/v3/contenttype/forms"/>
+  </ds:schemaRefs>
+</ds:datastoreItem>
 </file>
</xml_diff>

<commit_message>
pres update: finalized introduction
</commit_message>
<xml_diff>
--- a/docs/pres_midterm.pptx
+++ b/docs/pres_midterm.pptx
@@ -6,24 +6,22 @@
     <p:sldMasterId id="2147484114" r:id="rId5"/>
   </p:sldMasterIdLst>
   <p:notesMasterIdLst>
-    <p:notesMasterId r:id="rId21"/>
+    <p:notesMasterId r:id="rId19"/>
   </p:notesMasterIdLst>
   <p:sldIdLst>
     <p:sldId id="257" r:id="rId6"/>
     <p:sldId id="275" r:id="rId7"/>
     <p:sldId id="304" r:id="rId8"/>
-    <p:sldId id="305" r:id="rId9"/>
-    <p:sldId id="307" r:id="rId10"/>
-    <p:sldId id="309" r:id="rId11"/>
-    <p:sldId id="311" r:id="rId12"/>
-    <p:sldId id="312" r:id="rId13"/>
-    <p:sldId id="310" r:id="rId14"/>
-    <p:sldId id="296" r:id="rId15"/>
-    <p:sldId id="306" r:id="rId16"/>
-    <p:sldId id="278" r:id="rId17"/>
-    <p:sldId id="297" r:id="rId18"/>
-    <p:sldId id="279" r:id="rId19"/>
-    <p:sldId id="259" r:id="rId20"/>
+    <p:sldId id="307" r:id="rId9"/>
+    <p:sldId id="309" r:id="rId10"/>
+    <p:sldId id="311" r:id="rId11"/>
+    <p:sldId id="312" r:id="rId12"/>
+    <p:sldId id="310" r:id="rId13"/>
+    <p:sldId id="296" r:id="rId14"/>
+    <p:sldId id="306" r:id="rId15"/>
+    <p:sldId id="278" r:id="rId16"/>
+    <p:sldId id="279" r:id="rId17"/>
+    <p:sldId id="259" r:id="rId18"/>
   </p:sldIdLst>
   <p:sldSz cx="12192000" cy="6858000"/>
   <p:notesSz cx="6805613" cy="9944100"/>
@@ -778,7 +776,7 @@
           <a:p>
             <a:fld id="{80776EF6-B42D-624A-9B9C-BBF9E595853E}" type="slidenum">
               <a:rPr lang="en-BE" smtClean="0"/>
-              <a:t>5</a:t>
+              <a:t>4</a:t>
             </a:fld>
             <a:endParaRPr lang="en-BE"/>
           </a:p>
@@ -862,7 +860,7 @@
           <a:p>
             <a:fld id="{80776EF6-B42D-624A-9B9C-BBF9E595853E}" type="slidenum">
               <a:rPr lang="en-BE" smtClean="0"/>
-              <a:t>7</a:t>
+              <a:t>6</a:t>
             </a:fld>
             <a:endParaRPr lang="en-BE"/>
           </a:p>
@@ -946,7 +944,7 @@
           <a:p>
             <a:fld id="{80776EF6-B42D-624A-9B9C-BBF9E595853E}" type="slidenum">
               <a:rPr lang="en-BE" smtClean="0"/>
-              <a:t>9</a:t>
+              <a:t>8</a:t>
             </a:fld>
             <a:endParaRPr lang="en-BE"/>
           </a:p>
@@ -10393,7 +10391,7 @@
           <p:cNvPr id="2" name="Title 1">
             <a:extLst>
               <a:ext uri="{FF2B5EF4-FFF2-40B4-BE49-F238E27FC236}">
-                <a16:creationId xmlns:a16="http://schemas.microsoft.com/office/drawing/2014/main" id="{BA529C6E-45F6-EC47-9E62-697FE893C136}"/>
+                <a16:creationId xmlns:a16="http://schemas.microsoft.com/office/drawing/2014/main" id="{CF343AF8-9168-960A-B019-C2A49A61CA61}"/>
               </a:ext>
             </a:extLst>
           </p:cNvPr>
@@ -10409,19 +10407,16 @@
           <a:bodyPr/>
           <a:lstStyle/>
           <a:p>
-            <a:r>
-              <a:rPr lang="en-US" noProof="0" dirty="0"/>
-              <a:t>Method</a:t>
-            </a:r>
-          </a:p>
-        </p:txBody>
-      </p:sp>
-      <p:sp>
-        <p:nvSpPr>
-          <p:cNvPr id="3" name="Text Placeholder 2">
-            <a:extLst>
-              <a:ext uri="{FF2B5EF4-FFF2-40B4-BE49-F238E27FC236}">
-                <a16:creationId xmlns:a16="http://schemas.microsoft.com/office/drawing/2014/main" id="{AB02AE85-0D8F-2941-B863-417E24478159}"/>
+            <a:endParaRPr lang="en-BE" dirty="0"/>
+          </a:p>
+        </p:txBody>
+      </p:sp>
+      <p:sp>
+        <p:nvSpPr>
+          <p:cNvPr id="3" name="Slide Number Placeholder 2">
+            <a:extLst>
+              <a:ext uri="{FF2B5EF4-FFF2-40B4-BE49-F238E27FC236}">
+                <a16:creationId xmlns:a16="http://schemas.microsoft.com/office/drawing/2014/main" id="{26F5DA41-503D-310A-778E-CB715322F038}"/>
               </a:ext>
             </a:extLst>
           </p:cNvPr>
@@ -10429,7 +10424,7 @@
             <a:spLocks noGrp="1"/>
           </p:cNvSpPr>
           <p:nvPr>
-            <p:ph type="body" sz="quarter" idx="10"/>
+            <p:ph type="sldNum" sz="quarter" idx="10"/>
           </p:nvPr>
         </p:nvSpPr>
         <p:spPr/>
@@ -10437,14 +10432,47 @@
           <a:bodyPr/>
           <a:lstStyle/>
           <a:p>
-            <a:endParaRPr lang="en-US" dirty="0"/>
+            <a:fld id="{E038E271-308C-2E46-A3EC-56326F9084CC}" type="slidenum">
+              <a:rPr lang="nl-BE" smtClean="0"/>
+              <a:pPr/>
+              <a:t>10</a:t>
+            </a:fld>
+            <a:endParaRPr lang="nl-BE" dirty="0"/>
+          </a:p>
+        </p:txBody>
+      </p:sp>
+      <p:sp>
+        <p:nvSpPr>
+          <p:cNvPr id="4" name="Text Placeholder 3">
+            <a:extLst>
+              <a:ext uri="{FF2B5EF4-FFF2-40B4-BE49-F238E27FC236}">
+                <a16:creationId xmlns:a16="http://schemas.microsoft.com/office/drawing/2014/main" id="{D340C622-1ED9-B7A7-DD2B-71727414C6DE}"/>
+              </a:ext>
+            </a:extLst>
+          </p:cNvPr>
+          <p:cNvSpPr>
+            <a:spLocks noGrp="1"/>
+          </p:cNvSpPr>
+          <p:nvPr>
+            <p:ph type="body" sz="quarter" idx="11"/>
+          </p:nvPr>
+        </p:nvSpPr>
+        <p:spPr/>
+        <p:txBody>
+          <a:bodyPr/>
+          <a:lstStyle/>
+          <a:p>
+            <a:r>
+              <a:rPr lang="en-BE" dirty="0"/>
+              <a:t>Explain multi-instance evaluation protocol</a:t>
+            </a:r>
           </a:p>
         </p:txBody>
       </p:sp>
     </p:spTree>
     <p:extLst>
       <p:ext uri="{BB962C8B-B14F-4D97-AF65-F5344CB8AC3E}">
-        <p14:creationId xmlns:p14="http://schemas.microsoft.com/office/powerpoint/2010/main" val="3550223122"/>
+        <p14:creationId xmlns:p14="http://schemas.microsoft.com/office/powerpoint/2010/main" val="2482707471"/>
       </p:ext>
     </p:extLst>
   </p:cSld>
@@ -10476,7 +10504,7 @@
           <p:cNvPr id="2" name="Title 1">
             <a:extLst>
               <a:ext uri="{FF2B5EF4-FFF2-40B4-BE49-F238E27FC236}">
-                <a16:creationId xmlns:a16="http://schemas.microsoft.com/office/drawing/2014/main" id="{CF343AF8-9168-960A-B019-C2A49A61CA61}"/>
+                <a16:creationId xmlns:a16="http://schemas.microsoft.com/office/drawing/2014/main" id="{BA529C6E-45F6-EC47-9E62-697FE893C136}"/>
               </a:ext>
             </a:extLst>
           </p:cNvPr>
@@ -10492,16 +10520,19 @@
           <a:bodyPr/>
           <a:lstStyle/>
           <a:p>
-            <a:endParaRPr lang="en-BE" dirty="0"/>
-          </a:p>
-        </p:txBody>
-      </p:sp>
-      <p:sp>
-        <p:nvSpPr>
-          <p:cNvPr id="3" name="Slide Number Placeholder 2">
-            <a:extLst>
-              <a:ext uri="{FF2B5EF4-FFF2-40B4-BE49-F238E27FC236}">
-                <a16:creationId xmlns:a16="http://schemas.microsoft.com/office/drawing/2014/main" id="{26F5DA41-503D-310A-778E-CB715322F038}"/>
+            <a:r>
+              <a:rPr lang="en-US" noProof="0" dirty="0"/>
+              <a:t>Experiments</a:t>
+            </a:r>
+          </a:p>
+        </p:txBody>
+      </p:sp>
+      <p:sp>
+        <p:nvSpPr>
+          <p:cNvPr id="3" name="Text Placeholder 2">
+            <a:extLst>
+              <a:ext uri="{FF2B5EF4-FFF2-40B4-BE49-F238E27FC236}">
+                <a16:creationId xmlns:a16="http://schemas.microsoft.com/office/drawing/2014/main" id="{AB02AE85-0D8F-2941-B863-417E24478159}"/>
               </a:ext>
             </a:extLst>
           </p:cNvPr>
@@ -10509,7 +10540,7 @@
             <a:spLocks noGrp="1"/>
           </p:cNvSpPr>
           <p:nvPr>
-            <p:ph type="sldNum" sz="quarter" idx="10"/>
+            <p:ph type="body" sz="quarter" idx="10"/>
           </p:nvPr>
         </p:nvSpPr>
         <p:spPr/>
@@ -10517,47 +10548,14 @@
           <a:bodyPr/>
           <a:lstStyle/>
           <a:p>
-            <a:fld id="{E038E271-308C-2E46-A3EC-56326F9084CC}" type="slidenum">
-              <a:rPr lang="nl-BE" smtClean="0"/>
-              <a:pPr/>
-              <a:t>11</a:t>
-            </a:fld>
-            <a:endParaRPr lang="nl-BE" dirty="0"/>
-          </a:p>
-        </p:txBody>
-      </p:sp>
-      <p:sp>
-        <p:nvSpPr>
-          <p:cNvPr id="4" name="Text Placeholder 3">
-            <a:extLst>
-              <a:ext uri="{FF2B5EF4-FFF2-40B4-BE49-F238E27FC236}">
-                <a16:creationId xmlns:a16="http://schemas.microsoft.com/office/drawing/2014/main" id="{D340C622-1ED9-B7A7-DD2B-71727414C6DE}"/>
-              </a:ext>
-            </a:extLst>
-          </p:cNvPr>
-          <p:cNvSpPr>
-            <a:spLocks noGrp="1"/>
-          </p:cNvSpPr>
-          <p:nvPr>
-            <p:ph type="body" sz="quarter" idx="11"/>
-          </p:nvPr>
-        </p:nvSpPr>
-        <p:spPr/>
-        <p:txBody>
-          <a:bodyPr/>
-          <a:lstStyle/>
-          <a:p>
-            <a:r>
-              <a:rPr lang="en-BE" dirty="0"/>
-              <a:t>Explain multi-instance evaluation protocol</a:t>
-            </a:r>
+            <a:endParaRPr lang="en-US" dirty="0"/>
           </a:p>
         </p:txBody>
       </p:sp>
     </p:spTree>
     <p:extLst>
       <p:ext uri="{BB962C8B-B14F-4D97-AF65-F5344CB8AC3E}">
-        <p14:creationId xmlns:p14="http://schemas.microsoft.com/office/powerpoint/2010/main" val="2482707471"/>
+        <p14:creationId xmlns:p14="http://schemas.microsoft.com/office/powerpoint/2010/main" val="1843490164"/>
       </p:ext>
     </p:extLst>
   </p:cSld>
@@ -10606,172 +10604,6 @@
           <a:lstStyle/>
           <a:p>
             <a:r>
-              <a:rPr lang="en-US" noProof="0" dirty="0"/>
-              <a:t>Experiments</a:t>
-            </a:r>
-          </a:p>
-        </p:txBody>
-      </p:sp>
-      <p:sp>
-        <p:nvSpPr>
-          <p:cNvPr id="3" name="Text Placeholder 2">
-            <a:extLst>
-              <a:ext uri="{FF2B5EF4-FFF2-40B4-BE49-F238E27FC236}">
-                <a16:creationId xmlns:a16="http://schemas.microsoft.com/office/drawing/2014/main" id="{AB02AE85-0D8F-2941-B863-417E24478159}"/>
-              </a:ext>
-            </a:extLst>
-          </p:cNvPr>
-          <p:cNvSpPr>
-            <a:spLocks noGrp="1"/>
-          </p:cNvSpPr>
-          <p:nvPr>
-            <p:ph type="body" sz="quarter" idx="10"/>
-          </p:nvPr>
-        </p:nvSpPr>
-        <p:spPr/>
-        <p:txBody>
-          <a:bodyPr/>
-          <a:lstStyle/>
-          <a:p>
-            <a:endParaRPr lang="en-US" dirty="0"/>
-          </a:p>
-        </p:txBody>
-      </p:sp>
-    </p:spTree>
-    <p:extLst>
-      <p:ext uri="{BB962C8B-B14F-4D97-AF65-F5344CB8AC3E}">
-        <p14:creationId xmlns:p14="http://schemas.microsoft.com/office/powerpoint/2010/main" val="1843490164"/>
-      </p:ext>
-    </p:extLst>
-  </p:cSld>
-  <p:clrMapOvr>
-    <a:masterClrMapping/>
-  </p:clrMapOvr>
-</p:sld>
-</file>
-
-<file path=ppt/slides/slide13.xml><?xml version="1.0" encoding="utf-8"?>
-<p:sld xmlns:a="http://schemas.openxmlformats.org/drawingml/2006/main" xmlns:r="http://schemas.openxmlformats.org/officeDocument/2006/relationships" xmlns:p="http://schemas.openxmlformats.org/presentationml/2006/main">
-  <p:cSld>
-    <p:spTree>
-      <p:nvGrpSpPr>
-        <p:cNvPr id="1" name=""/>
-        <p:cNvGrpSpPr/>
-        <p:nvPr/>
-      </p:nvGrpSpPr>
-      <p:grpSpPr>
-        <a:xfrm>
-          <a:off x="0" y="0"/>
-          <a:ext cx="0" cy="0"/>
-          <a:chOff x="0" y="0"/>
-          <a:chExt cx="0" cy="0"/>
-        </a:xfrm>
-      </p:grpSpPr>
-      <p:sp>
-        <p:nvSpPr>
-          <p:cNvPr id="2" name="Title 1">
-            <a:extLst>
-              <a:ext uri="{FF2B5EF4-FFF2-40B4-BE49-F238E27FC236}">
-                <a16:creationId xmlns:a16="http://schemas.microsoft.com/office/drawing/2014/main" id="{BA529C6E-45F6-EC47-9E62-697FE893C136}"/>
-              </a:ext>
-            </a:extLst>
-          </p:cNvPr>
-          <p:cNvSpPr>
-            <a:spLocks noGrp="1"/>
-          </p:cNvSpPr>
-          <p:nvPr>
-            <p:ph type="title"/>
-          </p:nvPr>
-        </p:nvSpPr>
-        <p:spPr/>
-        <p:txBody>
-          <a:bodyPr/>
-          <a:lstStyle/>
-          <a:p>
-            <a:r>
-              <a:rPr lang="en-US" noProof="0" dirty="0"/>
-              <a:t>Problems</a:t>
-            </a:r>
-          </a:p>
-        </p:txBody>
-      </p:sp>
-      <p:sp>
-        <p:nvSpPr>
-          <p:cNvPr id="3" name="Text Placeholder 2">
-            <a:extLst>
-              <a:ext uri="{FF2B5EF4-FFF2-40B4-BE49-F238E27FC236}">
-                <a16:creationId xmlns:a16="http://schemas.microsoft.com/office/drawing/2014/main" id="{AB02AE85-0D8F-2941-B863-417E24478159}"/>
-              </a:ext>
-            </a:extLst>
-          </p:cNvPr>
-          <p:cNvSpPr>
-            <a:spLocks noGrp="1"/>
-          </p:cNvSpPr>
-          <p:nvPr>
-            <p:ph type="body" sz="quarter" idx="10"/>
-          </p:nvPr>
-        </p:nvSpPr>
-        <p:spPr/>
-        <p:txBody>
-          <a:bodyPr/>
-          <a:lstStyle/>
-          <a:p>
-            <a:endParaRPr lang="en-US" dirty="0"/>
-          </a:p>
-        </p:txBody>
-      </p:sp>
-    </p:spTree>
-    <p:extLst>
-      <p:ext uri="{BB962C8B-B14F-4D97-AF65-F5344CB8AC3E}">
-        <p14:creationId xmlns:p14="http://schemas.microsoft.com/office/powerpoint/2010/main" val="2536176281"/>
-      </p:ext>
-    </p:extLst>
-  </p:cSld>
-  <p:clrMapOvr>
-    <a:masterClrMapping/>
-  </p:clrMapOvr>
-</p:sld>
-</file>
-
-<file path=ppt/slides/slide14.xml><?xml version="1.0" encoding="utf-8"?>
-<p:sld xmlns:a="http://schemas.openxmlformats.org/drawingml/2006/main" xmlns:r="http://schemas.openxmlformats.org/officeDocument/2006/relationships" xmlns:p="http://schemas.openxmlformats.org/presentationml/2006/main">
-  <p:cSld>
-    <p:spTree>
-      <p:nvGrpSpPr>
-        <p:cNvPr id="1" name=""/>
-        <p:cNvGrpSpPr/>
-        <p:nvPr/>
-      </p:nvGrpSpPr>
-      <p:grpSpPr>
-        <a:xfrm>
-          <a:off x="0" y="0"/>
-          <a:ext cx="0" cy="0"/>
-          <a:chOff x="0" y="0"/>
-          <a:chExt cx="0" cy="0"/>
-        </a:xfrm>
-      </p:grpSpPr>
-      <p:sp>
-        <p:nvSpPr>
-          <p:cNvPr id="2" name="Title 1">
-            <a:extLst>
-              <a:ext uri="{FF2B5EF4-FFF2-40B4-BE49-F238E27FC236}">
-                <a16:creationId xmlns:a16="http://schemas.microsoft.com/office/drawing/2014/main" id="{BA529C6E-45F6-EC47-9E62-697FE893C136}"/>
-              </a:ext>
-            </a:extLst>
-          </p:cNvPr>
-          <p:cNvSpPr>
-            <a:spLocks noGrp="1"/>
-          </p:cNvSpPr>
-          <p:nvPr>
-            <p:ph type="title"/>
-          </p:nvPr>
-        </p:nvSpPr>
-        <p:spPr/>
-        <p:txBody>
-          <a:bodyPr/>
-          <a:lstStyle/>
-          <a:p>
-            <a:r>
               <a:rPr lang="en-US" dirty="0"/>
               <a:t>Next steps</a:t>
             </a:r>
@@ -10817,7 +10649,7 @@
 </p:sld>
 </file>
 
-<file path=ppt/slides/slide15.xml><?xml version="1.0" encoding="utf-8"?>
+<file path=ppt/slides/slide13.xml><?xml version="1.0" encoding="utf-8"?>
 <p:sld xmlns:a="http://schemas.openxmlformats.org/drawingml/2006/main" xmlns:r="http://schemas.openxmlformats.org/officeDocument/2006/relationships" xmlns:p="http://schemas.openxmlformats.org/presentationml/2006/main">
   <p:cSld>
     <p:spTree>
@@ -10992,7 +10824,7 @@
           <a:p>
             <a:r>
               <a:rPr lang="en-US" dirty="0"/>
-              <a:t>Evaluation protocol</a:t>
+              <a:t>Method</a:t>
             </a:r>
           </a:p>
           <a:p>
@@ -11004,7 +10836,7 @@
           <a:p>
             <a:r>
               <a:rPr lang="en-US" dirty="0"/>
-              <a:t>Future plans</a:t>
+              <a:t>Next steps</a:t>
             </a:r>
             <a:endParaRPr lang="en-GB" dirty="0"/>
           </a:p>
@@ -11125,172 +10957,6 @@
       </p:grpSpPr>
       <p:sp>
         <p:nvSpPr>
-          <p:cNvPr id="4" name="Title 3">
-            <a:extLst>
-              <a:ext uri="{FF2B5EF4-FFF2-40B4-BE49-F238E27FC236}">
-                <a16:creationId xmlns:a16="http://schemas.microsoft.com/office/drawing/2014/main" id="{D05BC202-D842-BA85-9922-2EFCBA8A3A9C}"/>
-              </a:ext>
-            </a:extLst>
-          </p:cNvPr>
-          <p:cNvSpPr>
-            <a:spLocks noGrp="1"/>
-          </p:cNvSpPr>
-          <p:nvPr>
-            <p:ph type="title"/>
-          </p:nvPr>
-        </p:nvSpPr>
-        <p:spPr/>
-        <p:txBody>
-          <a:bodyPr/>
-          <a:lstStyle/>
-          <a:p>
-            <a:endParaRPr lang="en-BE" dirty="0"/>
-          </a:p>
-        </p:txBody>
-      </p:sp>
-      <p:sp>
-        <p:nvSpPr>
-          <p:cNvPr id="5" name="Text Placeholder 4">
-            <a:extLst>
-              <a:ext uri="{FF2B5EF4-FFF2-40B4-BE49-F238E27FC236}">
-                <a16:creationId xmlns:a16="http://schemas.microsoft.com/office/drawing/2014/main" id="{730F96A7-DFF4-0D4F-7FEF-FF5C04180EA7}"/>
-              </a:ext>
-            </a:extLst>
-          </p:cNvPr>
-          <p:cNvSpPr>
-            <a:spLocks noGrp="1"/>
-          </p:cNvSpPr>
-          <p:nvPr>
-            <p:ph type="body" sz="quarter" idx="11"/>
-          </p:nvPr>
-        </p:nvSpPr>
-        <p:spPr/>
-        <p:txBody>
-          <a:bodyPr/>
-          <a:lstStyle/>
-          <a:p>
-            <a:pPr marL="742950" lvl="1" indent="-285750">
-              <a:lnSpc>
-                <a:spcPct val="107000"/>
-              </a:lnSpc>
-              <a:buFont typeface="Courier New" panose="02070309020205020404" pitchFamily="49" charset="0"/>
-              <a:buChar char="o"/>
-            </a:pPr>
-            <a:r>
-              <a:rPr lang="en-GB" sz="1800" dirty="0">
-                <a:solidFill>
-                  <a:srgbClr val="000000"/>
-                </a:solidFill>
-                <a:effectLst/>
-                <a:latin typeface="Helvetica Neue" panose="02000503000000020004" pitchFamily="2" charset="0"/>
-                <a:ea typeface="Calibri" panose="020F0502020204030204" pitchFamily="34" charset="0"/>
-                <a:cs typeface="Helvetica Neue" panose="02000503000000020004" pitchFamily="2" charset="0"/>
-              </a:rPr>
-              <a:t>Explain WSOL</a:t>
-            </a:r>
-          </a:p>
-          <a:p>
-            <a:pPr marL="742950" lvl="1" indent="-285750">
-              <a:lnSpc>
-                <a:spcPct val="107000"/>
-              </a:lnSpc>
-              <a:buFont typeface="Courier New" panose="02070309020205020404" pitchFamily="49" charset="0"/>
-              <a:buChar char="o"/>
-            </a:pPr>
-            <a:r>
-              <a:rPr lang="en-GB" sz="1800" dirty="0">
-                <a:solidFill>
-                  <a:srgbClr val="000000"/>
-                </a:solidFill>
-                <a:effectLst/>
-                <a:latin typeface="Helvetica Neue" panose="02000503000000020004" pitchFamily="2" charset="0"/>
-                <a:ea typeface="Calibri" panose="020F0502020204030204" pitchFamily="34" charset="0"/>
-                <a:cs typeface="Helvetica Neue" panose="02000503000000020004" pitchFamily="2" charset="0"/>
-              </a:rPr>
-              <a:t>Explain problem, (prior-art) solutions, improvements</a:t>
-            </a:r>
-          </a:p>
-          <a:p>
-            <a:pPr marL="742950" lvl="1" indent="-285750">
-              <a:lnSpc>
-                <a:spcPct val="107000"/>
-              </a:lnSpc>
-              <a:buFont typeface="Courier New" panose="02070309020205020404" pitchFamily="49" charset="0"/>
-              <a:buChar char="o"/>
-            </a:pPr>
-            <a:r>
-              <a:rPr lang="en-GB" sz="1800" dirty="0">
-                <a:solidFill>
-                  <a:srgbClr val="000000"/>
-                </a:solidFill>
-                <a:effectLst/>
-                <a:latin typeface="Helvetica Neue" panose="02000503000000020004" pitchFamily="2" charset="0"/>
-                <a:ea typeface="Calibri" panose="020F0502020204030204" pitchFamily="34" charset="0"/>
-                <a:cs typeface="Helvetica Neue" panose="02000503000000020004" pitchFamily="2" charset="0"/>
-              </a:rPr>
-              <a:t>Explain what multi-instance localization is, why it is interesting, which methods are used and why are they used.</a:t>
-            </a:r>
-          </a:p>
-          <a:p>
-            <a:pPr marL="742950" lvl="1" indent="-285750">
-              <a:lnSpc>
-                <a:spcPct val="107000"/>
-              </a:lnSpc>
-              <a:buFont typeface="Courier New" panose="02070309020205020404" pitchFamily="49" charset="0"/>
-              <a:buChar char="o"/>
-            </a:pPr>
-            <a:r>
-              <a:rPr lang="en-GB" sz="1800" dirty="0">
-                <a:solidFill>
-                  <a:srgbClr val="000000"/>
-                </a:solidFill>
-                <a:latin typeface="Helvetica Neue" panose="02000503000000020004" pitchFamily="2" charset="0"/>
-                <a:ea typeface="Calibri" panose="020F0502020204030204" pitchFamily="34" charset="0"/>
-                <a:cs typeface="Helvetica Neue" panose="02000503000000020004" pitchFamily="2" charset="0"/>
-              </a:rPr>
-              <a:t>State research question</a:t>
-            </a:r>
-            <a:endParaRPr lang="en-BE" sz="1800" dirty="0">
-              <a:effectLst/>
-              <a:latin typeface="Calibri" panose="020F0502020204030204" pitchFamily="34" charset="0"/>
-              <a:ea typeface="Calibri" panose="020F0502020204030204" pitchFamily="34" charset="0"/>
-              <a:cs typeface="Arial" panose="020B0604020202020204" pitchFamily="34" charset="0"/>
-            </a:endParaRPr>
-          </a:p>
-        </p:txBody>
-      </p:sp>
-    </p:spTree>
-    <p:extLst>
-      <p:ext uri="{BB962C8B-B14F-4D97-AF65-F5344CB8AC3E}">
-        <p14:creationId xmlns:p14="http://schemas.microsoft.com/office/powerpoint/2010/main" val="2061795671"/>
-      </p:ext>
-    </p:extLst>
-  </p:cSld>
-  <p:clrMapOvr>
-    <a:masterClrMapping/>
-  </p:clrMapOvr>
-</p:sld>
-</file>
-
-<file path=ppt/slides/slide5.xml><?xml version="1.0" encoding="utf-8"?>
-<p:sld xmlns:a="http://schemas.openxmlformats.org/drawingml/2006/main" xmlns:r="http://schemas.openxmlformats.org/officeDocument/2006/relationships" xmlns:p="http://schemas.openxmlformats.org/presentationml/2006/main">
-  <p:cSld>
-    <p:spTree>
-      <p:nvGrpSpPr>
-        <p:cNvPr id="1" name=""/>
-        <p:cNvGrpSpPr/>
-        <p:nvPr/>
-      </p:nvGrpSpPr>
-      <p:grpSpPr>
-        <a:xfrm>
-          <a:off x="0" y="0"/>
-          <a:ext cx="0" cy="0"/>
-          <a:chOff x="0" y="0"/>
-          <a:chExt cx="0" cy="0"/>
-        </a:xfrm>
-      </p:grpSpPr>
-      <p:sp>
-        <p:nvSpPr>
           <p:cNvPr id="2" name="Title 1">
             <a:extLst>
               <a:ext uri="{FF2B5EF4-FFF2-40B4-BE49-F238E27FC236}">
@@ -11346,7 +11012,7 @@
             <a:fld id="{E038E271-308C-2E46-A3EC-56326F9084CC}" type="slidenum">
               <a:rPr lang="nl-BE" smtClean="0"/>
               <a:pPr/>
-              <a:t>5</a:t>
+              <a:t>4</a:t>
             </a:fld>
             <a:endParaRPr lang="nl-BE" dirty="0"/>
           </a:p>
@@ -12005,6 +11671,178 @@
 </p:sld>
 </file>
 
+<file path=ppt/slides/slide5.xml><?xml version="1.0" encoding="utf-8"?>
+<p:sld xmlns:a="http://schemas.openxmlformats.org/drawingml/2006/main" xmlns:r="http://schemas.openxmlformats.org/officeDocument/2006/relationships" xmlns:p="http://schemas.openxmlformats.org/presentationml/2006/main">
+  <p:cSld>
+    <p:spTree>
+      <p:nvGrpSpPr>
+        <p:cNvPr id="1" name=""/>
+        <p:cNvGrpSpPr/>
+        <p:nvPr/>
+      </p:nvGrpSpPr>
+      <p:grpSpPr>
+        <a:xfrm>
+          <a:off x="0" y="0"/>
+          <a:ext cx="0" cy="0"/>
+          <a:chOff x="0" y="0"/>
+          <a:chExt cx="0" cy="0"/>
+        </a:xfrm>
+      </p:grpSpPr>
+      <p:sp>
+        <p:nvSpPr>
+          <p:cNvPr id="2" name="Title 1">
+            <a:extLst>
+              <a:ext uri="{FF2B5EF4-FFF2-40B4-BE49-F238E27FC236}">
+                <a16:creationId xmlns:a16="http://schemas.microsoft.com/office/drawing/2014/main" id="{A48FCAB0-376A-197E-8234-B626114DAC5E}"/>
+              </a:ext>
+            </a:extLst>
+          </p:cNvPr>
+          <p:cNvSpPr>
+            <a:spLocks noGrp="1"/>
+          </p:cNvSpPr>
+          <p:nvPr>
+            <p:ph type="title"/>
+          </p:nvPr>
+        </p:nvSpPr>
+        <p:spPr/>
+        <p:txBody>
+          <a:bodyPr/>
+          <a:lstStyle/>
+          <a:p>
+            <a:r>
+              <a:rPr lang="en-BE" dirty="0"/>
+              <a:t>Why WSOL?</a:t>
+            </a:r>
+          </a:p>
+        </p:txBody>
+      </p:sp>
+      <p:sp>
+        <p:nvSpPr>
+          <p:cNvPr id="3" name="Slide Number Placeholder 2">
+            <a:extLst>
+              <a:ext uri="{FF2B5EF4-FFF2-40B4-BE49-F238E27FC236}">
+                <a16:creationId xmlns:a16="http://schemas.microsoft.com/office/drawing/2014/main" id="{DCB89308-61E1-BDB6-8F74-26141CE13F6F}"/>
+              </a:ext>
+            </a:extLst>
+          </p:cNvPr>
+          <p:cNvSpPr>
+            <a:spLocks noGrp="1"/>
+          </p:cNvSpPr>
+          <p:nvPr>
+            <p:ph type="sldNum" sz="quarter" idx="10"/>
+          </p:nvPr>
+        </p:nvSpPr>
+        <p:spPr/>
+        <p:txBody>
+          <a:bodyPr/>
+          <a:lstStyle/>
+          <a:p>
+            <a:fld id="{E038E271-308C-2E46-A3EC-56326F9084CC}" type="slidenum">
+              <a:rPr lang="nl-BE" smtClean="0"/>
+              <a:pPr/>
+              <a:t>5</a:t>
+            </a:fld>
+            <a:endParaRPr lang="nl-BE" dirty="0"/>
+          </a:p>
+        </p:txBody>
+      </p:sp>
+      <p:sp>
+        <p:nvSpPr>
+          <p:cNvPr id="4" name="Text Placeholder 3">
+            <a:extLst>
+              <a:ext uri="{FF2B5EF4-FFF2-40B4-BE49-F238E27FC236}">
+                <a16:creationId xmlns:a16="http://schemas.microsoft.com/office/drawing/2014/main" id="{317A35C5-C1C2-A46C-AE21-73158890BEB1}"/>
+              </a:ext>
+            </a:extLst>
+          </p:cNvPr>
+          <p:cNvSpPr>
+            <a:spLocks noGrp="1"/>
+          </p:cNvSpPr>
+          <p:nvPr>
+            <p:ph type="body" sz="quarter" idx="11"/>
+          </p:nvPr>
+        </p:nvSpPr>
+        <p:spPr/>
+        <p:txBody>
+          <a:bodyPr>
+            <a:normAutofit/>
+          </a:bodyPr>
+          <a:lstStyle/>
+          <a:p>
+            <a:pPr marL="0" indent="0">
+              <a:buNone/>
+            </a:pPr>
+            <a:r>
+              <a:rPr lang="en-GB" dirty="0"/>
+              <a:t>Problem </a:t>
+            </a:r>
+          </a:p>
+          <a:p>
+            <a:r>
+              <a:rPr lang="en-GB" dirty="0"/>
+              <a:t>Object detection achieves great performance, but …</a:t>
+            </a:r>
+          </a:p>
+          <a:p>
+            <a:r>
+              <a:rPr lang="en-GB" dirty="0"/>
+              <a:t>… Requires costly human labelling of bounding boxes</a:t>
+            </a:r>
+          </a:p>
+          <a:p>
+            <a:r>
+              <a:rPr lang="en-GB" dirty="0"/>
+              <a:t>Localization labels not always available or of poor quality</a:t>
+            </a:r>
+          </a:p>
+          <a:p>
+            <a:pPr marL="0" indent="0">
+              <a:buNone/>
+            </a:pPr>
+            <a:endParaRPr lang="en-GB" dirty="0"/>
+          </a:p>
+          <a:p>
+            <a:pPr marL="0" indent="0">
+              <a:buNone/>
+            </a:pPr>
+            <a:r>
+              <a:rPr lang="en-GB" dirty="0"/>
+              <a:t>Solution</a:t>
+            </a:r>
+          </a:p>
+          <a:p>
+            <a:r>
+              <a:rPr lang="en-GB" dirty="0"/>
+              <a:t>Weakly supervised: Only image-level labels are used to train model </a:t>
+            </a:r>
+          </a:p>
+          <a:p>
+            <a:r>
+              <a:rPr lang="en-GB" dirty="0"/>
+              <a:t>Object localization based on learned features</a:t>
+            </a:r>
+          </a:p>
+          <a:p>
+            <a:pPr marL="0" indent="0">
+              <a:buNone/>
+            </a:pPr>
+            <a:endParaRPr lang="en-GB" dirty="0"/>
+          </a:p>
+        </p:txBody>
+      </p:sp>
+    </p:spTree>
+    <p:extLst>
+      <p:ext uri="{BB962C8B-B14F-4D97-AF65-F5344CB8AC3E}">
+        <p14:creationId xmlns:p14="http://schemas.microsoft.com/office/powerpoint/2010/main" val="2908672348"/>
+      </p:ext>
+    </p:extLst>
+  </p:cSld>
+  <p:clrMapOvr>
+    <a:masterClrMapping/>
+  </p:clrMapOvr>
+</p:sld>
+</file>
+
 <file path=ppt/slides/slide6.xml><?xml version="1.0" encoding="utf-8"?>
 <p:sld xmlns:a="http://schemas.openxmlformats.org/drawingml/2006/main" xmlns:r="http://schemas.openxmlformats.org/officeDocument/2006/relationships" xmlns:p="http://schemas.openxmlformats.org/presentationml/2006/main">
   <p:cSld>
@@ -12045,7 +11883,7 @@
           <a:p>
             <a:r>
               <a:rPr lang="en-BE" dirty="0"/>
-              <a:t>Why WSOL?</a:t>
+              <a:t>WSOL prior-art (deep learning)</a:t>
             </a:r>
           </a:p>
         </p:txBody>
@@ -12099,7 +11937,7 @@
         <p:spPr/>
         <p:txBody>
           <a:bodyPr>
-            <a:normAutofit/>
+            <a:normAutofit fontScale="92500" lnSpcReduction="10000"/>
           </a:bodyPr>
           <a:lstStyle/>
           <a:p>
@@ -12108,25 +11946,39 @@
             </a:pPr>
             <a:r>
               <a:rPr lang="en-GB" dirty="0"/>
-              <a:t>Problem </a:t>
+              <a:t>Class Activation Mapping (CAM) </a:t>
             </a:r>
           </a:p>
           <a:p>
             <a:r>
               <a:rPr lang="en-GB" dirty="0"/>
-              <a:t>Object detection achieves great performance, but …</a:t>
+              <a:t>Baseline deep learning method of WSOL</a:t>
             </a:r>
           </a:p>
           <a:p>
             <a:r>
               <a:rPr lang="en-GB" dirty="0"/>
-              <a:t>… Requires costly human labelling of bounding boxes</a:t>
+              <a:t>Uses feature activations to localize objects</a:t>
             </a:r>
           </a:p>
           <a:p>
             <a:r>
               <a:rPr lang="en-GB" dirty="0"/>
-              <a:t>Localization labels not always available or of poor quality</a:t>
+              <a:t>Limitations</a:t>
+            </a:r>
+          </a:p>
+          <a:p>
+            <a:pPr lvl="1"/>
+            <a:r>
+              <a:rPr lang="en-GB" dirty="0"/>
+              <a:t>Focus on discriminative parts of object: Object partly localized</a:t>
+            </a:r>
+          </a:p>
+          <a:p>
+            <a:pPr lvl="1"/>
+            <a:r>
+              <a:rPr lang="en-GB" dirty="0"/>
+              <a:t>Parts in background may activate and be recognized as object</a:t>
             </a:r>
           </a:p>
           <a:p>
@@ -12141,33 +11993,171 @@
             </a:pPr>
             <a:r>
               <a:rPr lang="en-GB" dirty="0"/>
-              <a:t>Solution</a:t>
-            </a:r>
-          </a:p>
-          <a:p>
+              <a:t>CAM research</a:t>
+            </a:r>
+          </a:p>
+          <a:p>
+            <a:pPr lvl="1"/>
             <a:r>
               <a:rPr lang="en-GB" dirty="0"/>
-              <a:t>Weakly supervised: Only image-level labels are used to train model </a:t>
-            </a:r>
-          </a:p>
-          <a:p>
+              <a:t>Use other techniques to overcome limitations</a:t>
+            </a:r>
+          </a:p>
+          <a:p>
+            <a:pPr lvl="2"/>
             <a:r>
               <a:rPr lang="en-GB" dirty="0"/>
-              <a:t>Object localization based on learned features</a:t>
-            </a:r>
-          </a:p>
-          <a:p>
-            <a:pPr marL="0" indent="0">
-              <a:buNone/>
-            </a:pPr>
-            <a:endParaRPr lang="en-GB" dirty="0"/>
-          </a:p>
-        </p:txBody>
-      </p:sp>
+              <a:t>E.g. region regularization (</a:t>
+            </a:r>
+            <a:r>
+              <a:rPr lang="en-GB" dirty="0" err="1"/>
+              <a:t>MinMaxCAM</a:t>
+            </a:r>
+            <a:r>
+              <a:rPr lang="en-GB" dirty="0"/>
+              <a:t>), gradient-weighted CAM (</a:t>
+            </a:r>
+            <a:r>
+              <a:rPr lang="en-GB" dirty="0" err="1"/>
+              <a:t>GradCAM</a:t>
+            </a:r>
+            <a:r>
+              <a:rPr lang="en-GB" dirty="0"/>
+              <a:t>), score-weighted CAM (</a:t>
+            </a:r>
+            <a:r>
+              <a:rPr lang="en-GB" dirty="0" err="1"/>
+              <a:t>ScoreCAM</a:t>
+            </a:r>
+            <a:r>
+              <a:rPr lang="en-GB" dirty="0"/>
+              <a:t>). </a:t>
+            </a:r>
+          </a:p>
+          <a:p>
+            <a:pPr lvl="1"/>
+            <a:r>
+              <a:rPr lang="en-GB" dirty="0"/>
+              <a:t>Large field of research</a:t>
+            </a:r>
+          </a:p>
+        </p:txBody>
+      </p:sp>
+      <p:grpSp>
+        <p:nvGrpSpPr>
+          <p:cNvPr id="7" name="Group 6">
+            <a:extLst>
+              <a:ext uri="{FF2B5EF4-FFF2-40B4-BE49-F238E27FC236}">
+                <a16:creationId xmlns:a16="http://schemas.microsoft.com/office/drawing/2014/main" id="{6DB9245F-1FCD-03F4-0DB0-2259B502ECEF}"/>
+              </a:ext>
+            </a:extLst>
+          </p:cNvPr>
+          <p:cNvGrpSpPr/>
+          <p:nvPr/>
+        </p:nvGrpSpPr>
+        <p:grpSpPr>
+          <a:xfrm>
+            <a:off x="8768763" y="1399071"/>
+            <a:ext cx="2507116" cy="3377604"/>
+            <a:chOff x="8768763" y="1399071"/>
+            <a:chExt cx="2507116" cy="3377604"/>
+          </a:xfrm>
+        </p:grpSpPr>
+        <p:pic>
+          <p:nvPicPr>
+            <p:cNvPr id="5" name="Picture 2" descr="Class Activation Maps – Johannes S. Fischer">
+              <a:extLst>
+                <a:ext uri="{FF2B5EF4-FFF2-40B4-BE49-F238E27FC236}">
+                  <a16:creationId xmlns:a16="http://schemas.microsoft.com/office/drawing/2014/main" id="{5F529A63-1806-96B3-2DCA-567C782E1A9D}"/>
+                </a:ext>
+              </a:extLst>
+            </p:cNvPr>
+            <p:cNvPicPr>
+              <a:picLocks noChangeAspect="1" noChangeArrowheads="1"/>
+            </p:cNvPicPr>
+            <p:nvPr/>
+          </p:nvPicPr>
+          <p:blipFill rotWithShape="1">
+            <a:blip r:embed="rId3">
+              <a:extLst>
+                <a:ext uri="{28A0092B-C50C-407E-A947-70E740481C1C}">
+                  <a14:useLocalDpi xmlns:a14="http://schemas.microsoft.com/office/drawing/2010/main" val="0"/>
+                </a:ext>
+              </a:extLst>
+            </a:blip>
+            <a:srcRect l="1367" t="5911" r="1480" b="2241"/>
+            <a:stretch/>
+          </p:blipFill>
+          <p:spPr bwMode="auto">
+            <a:xfrm>
+              <a:off x="8768763" y="1399071"/>
+              <a:ext cx="2507115" cy="1661947"/>
+            </a:xfrm>
+            <a:prstGeom prst="rect">
+              <a:avLst/>
+            </a:prstGeom>
+            <a:noFill/>
+            <a:extLst>
+              <a:ext uri="{909E8E84-426E-40DD-AFC4-6F175D3DCCD1}">
+                <a14:hiddenFill xmlns:a14="http://schemas.microsoft.com/office/drawing/2010/main">
+                  <a:solidFill>
+                    <a:srgbClr val="FFFFFF"/>
+                  </a:solidFill>
+                </a14:hiddenFill>
+              </a:ext>
+            </a:extLst>
+          </p:spPr>
+        </p:pic>
+        <p:pic>
+          <p:nvPicPr>
+            <p:cNvPr id="6" name="Picture 4" descr="Class Activation Maps – Johannes S. Fischer">
+              <a:extLst>
+                <a:ext uri="{FF2B5EF4-FFF2-40B4-BE49-F238E27FC236}">
+                  <a16:creationId xmlns:a16="http://schemas.microsoft.com/office/drawing/2014/main" id="{1EB1D08C-7C5B-42C3-9AC7-2B7363721CCF}"/>
+                </a:ext>
+              </a:extLst>
+            </p:cNvPr>
+            <p:cNvPicPr>
+              <a:picLocks noChangeAspect="1" noChangeArrowheads="1"/>
+            </p:cNvPicPr>
+            <p:nvPr/>
+          </p:nvPicPr>
+          <p:blipFill rotWithShape="1">
+            <a:blip r:embed="rId4">
+              <a:extLst>
+                <a:ext uri="{28A0092B-C50C-407E-A947-70E740481C1C}">
+                  <a14:useLocalDpi xmlns:a14="http://schemas.microsoft.com/office/drawing/2010/main" val="0"/>
+                </a:ext>
+              </a:extLst>
+            </a:blip>
+            <a:srcRect l="1745" t="5635" r="1390" b="2240"/>
+            <a:stretch/>
+          </p:blipFill>
+          <p:spPr bwMode="auto">
+            <a:xfrm>
+              <a:off x="8768764" y="3104778"/>
+              <a:ext cx="2507115" cy="1671897"/>
+            </a:xfrm>
+            <a:prstGeom prst="rect">
+              <a:avLst/>
+            </a:prstGeom>
+            <a:noFill/>
+            <a:extLst>
+              <a:ext uri="{909E8E84-426E-40DD-AFC4-6F175D3DCCD1}">
+                <a14:hiddenFill xmlns:a14="http://schemas.microsoft.com/office/drawing/2010/main">
+                  <a:solidFill>
+                    <a:srgbClr val="FFFFFF"/>
+                  </a:solidFill>
+                </a14:hiddenFill>
+              </a:ext>
+            </a:extLst>
+          </p:spPr>
+        </p:pic>
+      </p:grpSp>
     </p:spTree>
     <p:extLst>
       <p:ext uri="{BB962C8B-B14F-4D97-AF65-F5344CB8AC3E}">
-        <p14:creationId xmlns:p14="http://schemas.microsoft.com/office/powerpoint/2010/main" val="2908672348"/>
+        <p14:creationId xmlns:p14="http://schemas.microsoft.com/office/powerpoint/2010/main" val="3198382193"/>
       </p:ext>
     </p:extLst>
   </p:cSld>
@@ -12199,7 +12189,7 @@
           <p:cNvPr id="2" name="Title 1">
             <a:extLst>
               <a:ext uri="{FF2B5EF4-FFF2-40B4-BE49-F238E27FC236}">
-                <a16:creationId xmlns:a16="http://schemas.microsoft.com/office/drawing/2014/main" id="{A48FCAB0-376A-197E-8234-B626114DAC5E}"/>
+                <a16:creationId xmlns:a16="http://schemas.microsoft.com/office/drawing/2014/main" id="{43A5CB1D-8739-066A-C5B7-033434739CE0}"/>
               </a:ext>
             </a:extLst>
           </p:cNvPr>
@@ -12217,7 +12207,7 @@
           <a:p>
             <a:r>
               <a:rPr lang="en-BE" dirty="0"/>
-              <a:t>WSOL prior-art (deep learning)</a:t>
+              <a:t>Problems of WSOL</a:t>
             </a:r>
           </a:p>
         </p:txBody>
@@ -12227,7 +12217,7 @@
           <p:cNvPr id="3" name="Slide Number Placeholder 2">
             <a:extLst>
               <a:ext uri="{FF2B5EF4-FFF2-40B4-BE49-F238E27FC236}">
-                <a16:creationId xmlns:a16="http://schemas.microsoft.com/office/drawing/2014/main" id="{DCB89308-61E1-BDB6-8F74-26141CE13F6F}"/>
+                <a16:creationId xmlns:a16="http://schemas.microsoft.com/office/drawing/2014/main" id="{04D60DEF-F915-C0F0-E4F9-2F60EA6071D1}"/>
               </a:ext>
             </a:extLst>
           </p:cNvPr>
@@ -12257,7 +12247,7 @@
           <p:cNvPr id="4" name="Text Placeholder 3">
             <a:extLst>
               <a:ext uri="{FF2B5EF4-FFF2-40B4-BE49-F238E27FC236}">
-                <a16:creationId xmlns:a16="http://schemas.microsoft.com/office/drawing/2014/main" id="{317A35C5-C1C2-A46C-AE21-73158890BEB1}"/>
+                <a16:creationId xmlns:a16="http://schemas.microsoft.com/office/drawing/2014/main" id="{8FA195E2-18A4-803F-27D7-47F8957C053B}"/>
               </a:ext>
             </a:extLst>
           </p:cNvPr>
@@ -12275,104 +12265,65 @@
           </a:bodyPr>
           <a:lstStyle/>
           <a:p>
-            <a:pPr marL="0" indent="0">
-              <a:buNone/>
+            <a:r>
+              <a:rPr lang="en-BE" sz="3600" dirty="0"/>
+              <a:t>Inaccurate object coverage</a:t>
+            </a:r>
+          </a:p>
+          <a:p>
+            <a:pPr lvl="1"/>
+            <a:r>
+              <a:rPr lang="en-BE" sz="3200" dirty="0"/>
+              <a:t>CAM based on activations in higher layers </a:t>
+            </a:r>
+          </a:p>
+          <a:p>
+            <a:pPr lvl="2"/>
+            <a:r>
+              <a:rPr lang="en-BE" sz="2800" dirty="0"/>
+              <a:t>More related to object category</a:t>
+            </a:r>
+          </a:p>
+          <a:p>
+            <a:pPr lvl="2"/>
+            <a:r>
+              <a:rPr lang="en-GB" sz="2800" dirty="0"/>
+              <a:t>Loss of spatial accuracy due to lower resolution </a:t>
+            </a:r>
+            <a:endParaRPr lang="en-BE" sz="2800" dirty="0"/>
+          </a:p>
+          <a:p>
+            <a:r>
+              <a:rPr lang="en-BE" sz="3600" dirty="0"/>
+              <a:t>Assumption of single object in image</a:t>
+            </a:r>
+          </a:p>
+          <a:p>
+            <a:pPr lvl="1"/>
+            <a:r>
+              <a:rPr lang="en-BE" sz="3200" dirty="0"/>
+              <a:t>Lacking evaluation protocol for multiple object instances</a:t>
+            </a:r>
+          </a:p>
+          <a:p>
+            <a:pPr lvl="1"/>
+            <a:r>
+              <a:rPr lang="en-BE" sz="3200" dirty="0"/>
+              <a:t>No prior-art for multiple instance WSOL!</a:t>
+            </a:r>
+          </a:p>
+          <a:p>
+            <a:pPr lvl="1"/>
+            <a:endParaRPr lang="en-BE" sz="3200" dirty="0"/>
+          </a:p>
+          <a:p>
+            <a:pPr>
+              <a:buFont typeface="Wingdings" pitchFamily="2" charset="2"/>
+              <a:buChar char="Ø"/>
             </a:pPr>
             <a:r>
-              <a:rPr lang="en-GB" dirty="0"/>
-              <a:t>Class Activation Mapping (CAM) </a:t>
-            </a:r>
-          </a:p>
-          <a:p>
-            <a:r>
-              <a:rPr lang="en-GB" dirty="0"/>
-              <a:t>Baseline deep learning method of WSOL</a:t>
-            </a:r>
-          </a:p>
-          <a:p>
-            <a:r>
-              <a:rPr lang="en-GB" dirty="0"/>
-              <a:t>Uses feature activations to localize objects</a:t>
-            </a:r>
-          </a:p>
-          <a:p>
-            <a:r>
-              <a:rPr lang="en-GB" dirty="0"/>
-              <a:t>Limitations</a:t>
-            </a:r>
-          </a:p>
-          <a:p>
-            <a:pPr lvl="1"/>
-            <a:r>
-              <a:rPr lang="en-GB" dirty="0"/>
-              <a:t>Focus on discriminative parts of object: Object partly localized</a:t>
-            </a:r>
-          </a:p>
-          <a:p>
-            <a:pPr lvl="1"/>
-            <a:r>
-              <a:rPr lang="en-GB" dirty="0"/>
-              <a:t>Parts in background may activate and be recognized as object</a:t>
-            </a:r>
-          </a:p>
-          <a:p>
-            <a:pPr marL="0" indent="0">
-              <a:buNone/>
-            </a:pPr>
-            <a:endParaRPr lang="en-GB" dirty="0"/>
-          </a:p>
-          <a:p>
-            <a:pPr marL="0" indent="0">
-              <a:buNone/>
-            </a:pPr>
-            <a:r>
-              <a:rPr lang="en-GB" dirty="0"/>
-              <a:t>CAM research</a:t>
-            </a:r>
-          </a:p>
-          <a:p>
-            <a:pPr lvl="1"/>
-            <a:r>
-              <a:rPr lang="en-GB" dirty="0"/>
-              <a:t>Use other techniques to overcome limitations</a:t>
-            </a:r>
-          </a:p>
-          <a:p>
-            <a:pPr lvl="2"/>
-            <a:r>
-              <a:rPr lang="en-GB" dirty="0"/>
-              <a:t>E.g. region regularization (</a:t>
-            </a:r>
-            <a:r>
-              <a:rPr lang="en-GB" dirty="0" err="1"/>
-              <a:t>MinMaxCAM</a:t>
-            </a:r>
-            <a:r>
-              <a:rPr lang="en-GB" dirty="0"/>
-              <a:t>), gradient-weighted CAM (</a:t>
-            </a:r>
-            <a:r>
-              <a:rPr lang="en-GB" dirty="0" err="1"/>
-              <a:t>GradCAM</a:t>
-            </a:r>
-            <a:r>
-              <a:rPr lang="en-GB" dirty="0"/>
-              <a:t>), score-weighted CAM (</a:t>
-            </a:r>
-            <a:r>
-              <a:rPr lang="en-GB" dirty="0" err="1"/>
-              <a:t>ScoreCAM</a:t>
-            </a:r>
-            <a:r>
-              <a:rPr lang="en-GB" dirty="0"/>
-              <a:t>). </a:t>
-            </a:r>
-          </a:p>
-          <a:p>
-            <a:pPr lvl="1"/>
-            <a:r>
-              <a:rPr lang="en-GB" dirty="0"/>
-              <a:t>Large field of research</a:t>
+              <a:rPr lang="en-BE" sz="3600" dirty="0"/>
+              <a:t>Interesting to evaluate multi-instance WSOL</a:t>
             </a:r>
           </a:p>
         </p:txBody>
@@ -12380,7 +12331,7 @@
     </p:spTree>
     <p:extLst>
       <p:ext uri="{BB962C8B-B14F-4D97-AF65-F5344CB8AC3E}">
-        <p14:creationId xmlns:p14="http://schemas.microsoft.com/office/powerpoint/2010/main" val="3198382193"/>
+        <p14:creationId xmlns:p14="http://schemas.microsoft.com/office/powerpoint/2010/main" val="3212442971"/>
       </p:ext>
     </p:extLst>
   </p:cSld>
@@ -12412,7 +12363,7 @@
           <p:cNvPr id="2" name="Title 1">
             <a:extLst>
               <a:ext uri="{FF2B5EF4-FFF2-40B4-BE49-F238E27FC236}">
-                <a16:creationId xmlns:a16="http://schemas.microsoft.com/office/drawing/2014/main" id="{43A5CB1D-8739-066A-C5B7-033434739CE0}"/>
+                <a16:creationId xmlns:a16="http://schemas.microsoft.com/office/drawing/2014/main" id="{A48FCAB0-376A-197E-8234-B626114DAC5E}"/>
               </a:ext>
             </a:extLst>
           </p:cNvPr>
@@ -12430,7 +12381,7 @@
           <a:p>
             <a:r>
               <a:rPr lang="en-BE" dirty="0"/>
-              <a:t>Problems of WSOL</a:t>
+              <a:t>Research question</a:t>
             </a:r>
           </a:p>
         </p:txBody>
@@ -12440,7 +12391,7 @@
           <p:cNvPr id="3" name="Slide Number Placeholder 2">
             <a:extLst>
               <a:ext uri="{FF2B5EF4-FFF2-40B4-BE49-F238E27FC236}">
-                <a16:creationId xmlns:a16="http://schemas.microsoft.com/office/drawing/2014/main" id="{04D60DEF-F915-C0F0-E4F9-2F60EA6071D1}"/>
+                <a16:creationId xmlns:a16="http://schemas.microsoft.com/office/drawing/2014/main" id="{DCB89308-61E1-BDB6-8F74-26141CE13F6F}"/>
               </a:ext>
             </a:extLst>
           </p:cNvPr>
@@ -12470,7 +12421,7 @@
           <p:cNvPr id="4" name="Text Placeholder 3">
             <a:extLst>
               <a:ext uri="{FF2B5EF4-FFF2-40B4-BE49-F238E27FC236}">
-                <a16:creationId xmlns:a16="http://schemas.microsoft.com/office/drawing/2014/main" id="{8FA195E2-18A4-803F-27D7-47F8957C053B}"/>
+                <a16:creationId xmlns:a16="http://schemas.microsoft.com/office/drawing/2014/main" id="{317A35C5-C1C2-A46C-AE21-73158890BEB1}"/>
               </a:ext>
             </a:extLst>
           </p:cNvPr>
@@ -12484,69 +12435,102 @@
         <p:spPr/>
         <p:txBody>
           <a:bodyPr>
-            <a:normAutofit fontScale="92500" lnSpcReduction="10000"/>
+            <a:normAutofit/>
           </a:bodyPr>
           <a:lstStyle/>
           <a:p>
             <a:r>
-              <a:rPr lang="en-BE" sz="3600" dirty="0"/>
-              <a:t>Inaccurate object coverage</a:t>
+              <a:rPr lang="en-GB" dirty="0"/>
+              <a:t>Can we detect multiple objects of the same class using WSOL?</a:t>
+            </a:r>
+          </a:p>
+          <a:p>
+            <a:pPr marL="531812" lvl="1" indent="-171450">
+              <a:buFont typeface="Arial" panose="020B0604020202020204" pitchFamily="34" charset="0"/>
+              <a:buChar char="•"/>
+            </a:pPr>
+            <a:r>
+              <a:rPr lang="en-GB" dirty="0">
+                <a:ea typeface="+mn-ea"/>
+                <a:cs typeface="+mn-cs"/>
+              </a:rPr>
+              <a:t>A</a:t>
+            </a:r>
+            <a:r>
+              <a:rPr lang="en-GB" kern="1200" dirty="0">
+                <a:solidFill>
+                  <a:schemeClr val="tx1"/>
+                </a:solidFill>
+                <a:effectLst/>
+                <a:latin typeface="+mn-lt"/>
+                <a:ea typeface="+mn-ea"/>
+                <a:cs typeface="+mn-cs"/>
+              </a:rPr>
+              <a:t>ssess performance of specific CAM-methods to detect multiple object instances</a:t>
+            </a:r>
+          </a:p>
+          <a:p>
+            <a:pPr marL="531812" lvl="1" indent="-171450">
+              <a:buFont typeface="Arial" panose="020B0604020202020204" pitchFamily="34" charset="0"/>
+              <a:buChar char="•"/>
+            </a:pPr>
+            <a:r>
+              <a:rPr lang="en-GB" kern="1200" dirty="0">
+                <a:solidFill>
+                  <a:schemeClr val="tx1"/>
+                </a:solidFill>
+                <a:effectLst/>
+                <a:latin typeface="+mn-lt"/>
+                <a:ea typeface="+mn-ea"/>
+                <a:cs typeface="+mn-cs"/>
+              </a:rPr>
+              <a:t>Investigate mechanisms for those methods</a:t>
+            </a:r>
+            <a:r>
+              <a:rPr lang="en-GB" kern="1200" baseline="0" dirty="0">
+                <a:solidFill>
+                  <a:schemeClr val="tx1"/>
+                </a:solidFill>
+                <a:effectLst/>
+                <a:latin typeface="+mn-lt"/>
+                <a:ea typeface="+mn-ea"/>
+                <a:cs typeface="+mn-cs"/>
+              </a:rPr>
+              <a:t> to improve localization of multiple object instances in images</a:t>
+            </a:r>
+          </a:p>
+          <a:p>
+            <a:pPr marL="531812" lvl="1" indent="-171450">
+              <a:buFont typeface="Arial" panose="020B0604020202020204" pitchFamily="34" charset="0"/>
+              <a:buChar char="•"/>
+            </a:pPr>
+            <a:endParaRPr lang="en-GB" dirty="0"/>
+          </a:p>
+          <a:p>
+            <a:r>
+              <a:rPr lang="en-GB" dirty="0"/>
+              <a:t>This research</a:t>
             </a:r>
           </a:p>
           <a:p>
             <a:pPr lvl="1"/>
             <a:r>
-              <a:rPr lang="en-BE" sz="3200" dirty="0"/>
-              <a:t>CAM based on activations in higher layers </a:t>
-            </a:r>
-          </a:p>
-          <a:p>
-            <a:pPr lvl="2"/>
-            <a:r>
-              <a:rPr lang="en-BE" sz="2800" dirty="0"/>
-              <a:t>More related to object category</a:t>
-            </a:r>
-          </a:p>
-          <a:p>
-            <a:pPr lvl="2"/>
-            <a:r>
-              <a:rPr lang="en-GB" sz="2800" dirty="0"/>
-              <a:t>Loss of spatial accuracy due to lower resolution </a:t>
-            </a:r>
-            <a:endParaRPr lang="en-BE" sz="2800" dirty="0"/>
-          </a:p>
-          <a:p>
-            <a:r>
-              <a:rPr lang="en-BE" sz="3600" dirty="0"/>
-              <a:t>Assumption of single object in image</a:t>
+              <a:rPr lang="en-GB" dirty="0"/>
+              <a:t>Define new evaluation method for multiple-instance WSOL</a:t>
             </a:r>
           </a:p>
           <a:p>
             <a:pPr lvl="1"/>
             <a:r>
-              <a:rPr lang="en-BE" sz="3200" dirty="0"/>
-              <a:t>Lacking evaluation protocol for multiple object instances</a:t>
+              <a:rPr lang="en-GB" dirty="0"/>
+              <a:t>Benchmark new metrics on existing CAM methods</a:t>
             </a:r>
           </a:p>
           <a:p>
             <a:pPr lvl="1"/>
             <a:r>
-              <a:rPr lang="en-BE" sz="3200" dirty="0"/>
-              <a:t>No prior-art for multiple instance WSOL!</a:t>
-            </a:r>
-          </a:p>
-          <a:p>
-            <a:pPr lvl="1"/>
-            <a:endParaRPr lang="en-BE" sz="3200" dirty="0"/>
-          </a:p>
-          <a:p>
-            <a:pPr>
-              <a:buFont typeface="Wingdings" pitchFamily="2" charset="2"/>
-              <a:buChar char="Ø"/>
-            </a:pPr>
-            <a:r>
-              <a:rPr lang="en-BE" sz="3600" dirty="0"/>
-              <a:t>Interesting to evaluate multi-instance WSOL</a:t>
+              <a:rPr lang="en-GB" dirty="0"/>
+              <a:t>Find improvements for multiple instance localization</a:t>
             </a:r>
           </a:p>
         </p:txBody>
@@ -12554,7 +12538,7 @@
     </p:spTree>
     <p:extLst>
       <p:ext uri="{BB962C8B-B14F-4D97-AF65-F5344CB8AC3E}">
-        <p14:creationId xmlns:p14="http://schemas.microsoft.com/office/powerpoint/2010/main" val="3212442971"/>
+        <p14:creationId xmlns:p14="http://schemas.microsoft.com/office/powerpoint/2010/main" val="2278143303"/>
       </p:ext>
     </p:extLst>
   </p:cSld>
@@ -12586,7 +12570,7 @@
           <p:cNvPr id="2" name="Title 1">
             <a:extLst>
               <a:ext uri="{FF2B5EF4-FFF2-40B4-BE49-F238E27FC236}">
-                <a16:creationId xmlns:a16="http://schemas.microsoft.com/office/drawing/2014/main" id="{A48FCAB0-376A-197E-8234-B626114DAC5E}"/>
+                <a16:creationId xmlns:a16="http://schemas.microsoft.com/office/drawing/2014/main" id="{BA529C6E-45F6-EC47-9E62-697FE893C136}"/>
               </a:ext>
             </a:extLst>
           </p:cNvPr>
@@ -12603,18 +12587,18 @@
           <a:lstStyle/>
           <a:p>
             <a:r>
-              <a:rPr lang="en-BE" dirty="0"/>
-              <a:t>Research question</a:t>
-            </a:r>
-          </a:p>
-        </p:txBody>
-      </p:sp>
-      <p:sp>
-        <p:nvSpPr>
-          <p:cNvPr id="3" name="Slide Number Placeholder 2">
-            <a:extLst>
-              <a:ext uri="{FF2B5EF4-FFF2-40B4-BE49-F238E27FC236}">
-                <a16:creationId xmlns:a16="http://schemas.microsoft.com/office/drawing/2014/main" id="{DCB89308-61E1-BDB6-8F74-26141CE13F6F}"/>
+              <a:rPr lang="en-US" noProof="0" dirty="0"/>
+              <a:t>Method</a:t>
+            </a:r>
+          </a:p>
+        </p:txBody>
+      </p:sp>
+      <p:sp>
+        <p:nvSpPr>
+          <p:cNvPr id="3" name="Text Placeholder 2">
+            <a:extLst>
+              <a:ext uri="{FF2B5EF4-FFF2-40B4-BE49-F238E27FC236}">
+                <a16:creationId xmlns:a16="http://schemas.microsoft.com/office/drawing/2014/main" id="{AB02AE85-0D8F-2941-B863-417E24478159}"/>
               </a:ext>
             </a:extLst>
           </p:cNvPr>
@@ -12622,7 +12606,7 @@
             <a:spLocks noGrp="1"/>
           </p:cNvSpPr>
           <p:nvPr>
-            <p:ph type="sldNum" sz="quarter" idx="10"/>
+            <p:ph type="body" sz="quarter" idx="10"/>
           </p:nvPr>
         </p:nvSpPr>
         <p:spPr/>
@@ -12630,138 +12614,14 @@
           <a:bodyPr/>
           <a:lstStyle/>
           <a:p>
-            <a:fld id="{E038E271-308C-2E46-A3EC-56326F9084CC}" type="slidenum">
-              <a:rPr lang="nl-BE" smtClean="0"/>
-              <a:pPr/>
-              <a:t>9</a:t>
-            </a:fld>
-            <a:endParaRPr lang="nl-BE" dirty="0"/>
-          </a:p>
-        </p:txBody>
-      </p:sp>
-      <p:sp>
-        <p:nvSpPr>
-          <p:cNvPr id="4" name="Text Placeholder 3">
-            <a:extLst>
-              <a:ext uri="{FF2B5EF4-FFF2-40B4-BE49-F238E27FC236}">
-                <a16:creationId xmlns:a16="http://schemas.microsoft.com/office/drawing/2014/main" id="{317A35C5-C1C2-A46C-AE21-73158890BEB1}"/>
-              </a:ext>
-            </a:extLst>
-          </p:cNvPr>
-          <p:cNvSpPr>
-            <a:spLocks noGrp="1"/>
-          </p:cNvSpPr>
-          <p:nvPr>
-            <p:ph type="body" sz="quarter" idx="11"/>
-          </p:nvPr>
-        </p:nvSpPr>
-        <p:spPr/>
-        <p:txBody>
-          <a:bodyPr>
-            <a:normAutofit/>
-          </a:bodyPr>
-          <a:lstStyle/>
-          <a:p>
-            <a:r>
-              <a:rPr lang="en-GB" dirty="0"/>
-              <a:t>Can we detect multiple objects of the same class using WSOL?</a:t>
-            </a:r>
-          </a:p>
-          <a:p>
-            <a:pPr marL="531812" lvl="1" indent="-171450">
-              <a:buFont typeface="Arial" panose="020B0604020202020204" pitchFamily="34" charset="0"/>
-              <a:buChar char="•"/>
-            </a:pPr>
-            <a:r>
-              <a:rPr lang="en-GB" dirty="0">
-                <a:ea typeface="+mn-ea"/>
-                <a:cs typeface="+mn-cs"/>
-              </a:rPr>
-              <a:t>A</a:t>
-            </a:r>
-            <a:r>
-              <a:rPr lang="en-GB" kern="1200" dirty="0">
-                <a:solidFill>
-                  <a:schemeClr val="tx1"/>
-                </a:solidFill>
-                <a:effectLst/>
-                <a:latin typeface="+mn-lt"/>
-                <a:ea typeface="+mn-ea"/>
-                <a:cs typeface="+mn-cs"/>
-              </a:rPr>
-              <a:t>ssess performance of specific CAM-methods to detect multiple object instances</a:t>
-            </a:r>
-          </a:p>
-          <a:p>
-            <a:pPr marL="531812" lvl="1" indent="-171450">
-              <a:buFont typeface="Arial" panose="020B0604020202020204" pitchFamily="34" charset="0"/>
-              <a:buChar char="•"/>
-            </a:pPr>
-            <a:r>
-              <a:rPr lang="en-GB" kern="1200" dirty="0">
-                <a:solidFill>
-                  <a:schemeClr val="tx1"/>
-                </a:solidFill>
-                <a:effectLst/>
-                <a:latin typeface="+mn-lt"/>
-                <a:ea typeface="+mn-ea"/>
-                <a:cs typeface="+mn-cs"/>
-              </a:rPr>
-              <a:t>Investigate mechanisms for those methods</a:t>
-            </a:r>
-            <a:r>
-              <a:rPr lang="en-GB" kern="1200" baseline="0" dirty="0">
-                <a:solidFill>
-                  <a:schemeClr val="tx1"/>
-                </a:solidFill>
-                <a:effectLst/>
-                <a:latin typeface="+mn-lt"/>
-                <a:ea typeface="+mn-ea"/>
-                <a:cs typeface="+mn-cs"/>
-              </a:rPr>
-              <a:t> to improve localization of multiple object instances in images</a:t>
-            </a:r>
-          </a:p>
-          <a:p>
-            <a:pPr marL="531812" lvl="1" indent="-171450">
-              <a:buFont typeface="Arial" panose="020B0604020202020204" pitchFamily="34" charset="0"/>
-              <a:buChar char="•"/>
-            </a:pPr>
-            <a:endParaRPr lang="en-GB" dirty="0"/>
-          </a:p>
-          <a:p>
-            <a:r>
-              <a:rPr lang="en-GB" dirty="0"/>
-              <a:t>This research</a:t>
-            </a:r>
-          </a:p>
-          <a:p>
-            <a:pPr lvl="1"/>
-            <a:r>
-              <a:rPr lang="en-GB" dirty="0"/>
-              <a:t>Define new evaluation method for multiple-instance WSOL</a:t>
-            </a:r>
-          </a:p>
-          <a:p>
-            <a:pPr lvl="1"/>
-            <a:r>
-              <a:rPr lang="en-GB" dirty="0"/>
-              <a:t>Benchmark new metrics on existing CAM methods</a:t>
-            </a:r>
-          </a:p>
-          <a:p>
-            <a:pPr lvl="1"/>
-            <a:r>
-              <a:rPr lang="en-GB" dirty="0"/>
-              <a:t>Find improvements for multiple instance localization</a:t>
-            </a:r>
+            <a:endParaRPr lang="en-US" dirty="0"/>
           </a:p>
         </p:txBody>
       </p:sp>
     </p:spTree>
     <p:extLst>
       <p:ext uri="{BB962C8B-B14F-4D97-AF65-F5344CB8AC3E}">
-        <p14:creationId xmlns:p14="http://schemas.microsoft.com/office/powerpoint/2010/main" val="2278143303"/>
+        <p14:creationId xmlns:p14="http://schemas.microsoft.com/office/powerpoint/2010/main" val="3550223122"/>
       </p:ext>
     </p:extLst>
   </p:cSld>
@@ -13092,7 +12952,7 @@
         </a:ln>
         <a:extLst>
           <a:ext uri="{91240B29-F687-4f45-9708-019B960494DF}">
-            <a14:hiddenLine xmlns:p="http://schemas.openxmlformats.org/presentationml/2006/main" xmlns="" xmlns:a14="http://schemas.microsoft.com/office/drawing/2010/main" w="9525">
+            <a14:hiddenLine xmlns:a14="http://schemas.microsoft.com/office/drawing/2010/main" xmlns="" xmlns:p="http://schemas.openxmlformats.org/presentationml/2006/main" w="9525">
               <a:solidFill>
                 <a:srgbClr val="000000"/>
               </a:solidFill>
@@ -13770,6 +13630,12 @@
 </file>
 
 <file path=customXml/item1.xml><?xml version="1.0" encoding="utf-8"?>
+<p:properties xmlns:p="http://schemas.microsoft.com/office/2006/metadata/properties" xmlns:xsi="http://www.w3.org/2001/XMLSchema-instance" xmlns:pc="http://schemas.microsoft.com/office/infopath/2007/PartnerControls">
+  <documentManagement/>
+</p:properties>
+</file>
+
+<file path=customXml/item2.xml><?xml version="1.0" encoding="utf-8"?>
 <ct:contentTypeSchema xmlns:ct="http://schemas.microsoft.com/office/2006/metadata/contentType" xmlns:ma="http://schemas.microsoft.com/office/2006/metadata/properties/metaAttributes" ct:_="" ma:_="" ma:contentTypeName="Document" ma:contentTypeID="0x010100707C9875C091B247AB9617006510CC43" ma:contentTypeVersion="9" ma:contentTypeDescription="Een nieuw document maken." ma:contentTypeScope="" ma:versionID="6792b0d8b1b497ec7b6f2fc518ad6b71">
   <xsd:schema xmlns:xsd="http://www.w3.org/2001/XMLSchema" xmlns:xs="http://www.w3.org/2001/XMLSchema" xmlns:p="http://schemas.microsoft.com/office/2006/metadata/properties" xmlns:ns2="a09e4e9c-009f-4841-8876-57cddbde6e17" xmlns:ns3="e4e19ae9-58fe-4993-a35b-a8a84bb511ff" targetNamespace="http://schemas.microsoft.com/office/2006/metadata/properties" ma:root="true" ma:fieldsID="4e3ada4487ef8e46945618bd17b59294" ns2:_="" ns3:_="">
     <xsd:import namespace="a09e4e9c-009f-4841-8876-57cddbde6e17"/>
@@ -13966,12 +13832,6 @@
 </ct:contentTypeSchema>
 </file>
 
-<file path=customXml/item2.xml><?xml version="1.0" encoding="utf-8"?>
-<p:properties xmlns:p="http://schemas.microsoft.com/office/2006/metadata/properties" xmlns:xsi="http://www.w3.org/2001/XMLSchema-instance" xmlns:pc="http://schemas.microsoft.com/office/infopath/2007/PartnerControls">
-  <documentManagement/>
-</p:properties>
-</file>
-
 <file path=customXml/item3.xml><?xml version="1.0" encoding="utf-8"?>
 <?mso-contentType ?>
 <FormTemplates xmlns="http://schemas.microsoft.com/sharepoint/v3/contenttype/forms">
@@ -13982,6 +13842,15 @@
 </file>
 
 <file path=customXml/itemProps1.xml><?xml version="1.0" encoding="utf-8"?>
+<ds:datastoreItem xmlns:ds="http://schemas.openxmlformats.org/officeDocument/2006/customXml" ds:itemID="{A5A93269-0A2D-4449-AFE7-E8570D6EC4CB}">
+  <ds:schemaRefs>
+    <ds:schemaRef ds:uri="http://schemas.microsoft.com/office/2006/metadata/properties"/>
+    <ds:schemaRef ds:uri="http://schemas.microsoft.com/office/infopath/2007/PartnerControls"/>
+  </ds:schemaRefs>
+</ds:datastoreItem>
+</file>
+
+<file path=customXml/itemProps2.xml><?xml version="1.0" encoding="utf-8"?>
 <ds:datastoreItem xmlns:ds="http://schemas.openxmlformats.org/officeDocument/2006/customXml" ds:itemID="{54449BF5-F7E1-46D5-B581-A176D4426B3C}">
   <ds:schemaRefs>
     <ds:schemaRef ds:uri="http://schemas.microsoft.com/office/2006/metadata/contentType"/>
@@ -14000,15 +13869,6 @@
 </ds:datastoreItem>
 </file>
 
-<file path=customXml/itemProps2.xml><?xml version="1.0" encoding="utf-8"?>
-<ds:datastoreItem xmlns:ds="http://schemas.openxmlformats.org/officeDocument/2006/customXml" ds:itemID="{A5A93269-0A2D-4449-AFE7-E8570D6EC4CB}">
-  <ds:schemaRefs>
-    <ds:schemaRef ds:uri="http://schemas.microsoft.com/office/2006/metadata/properties"/>
-    <ds:schemaRef ds:uri="http://schemas.microsoft.com/office/infopath/2007/PartnerControls"/>
-  </ds:schemaRefs>
-</ds:datastoreItem>
-</file>
-
 <file path=customXml/itemProps3.xml><?xml version="1.0" encoding="utf-8"?>
 <ds:datastoreItem xmlns:ds="http://schemas.openxmlformats.org/officeDocument/2006/customXml" ds:itemID="{5D6EDECA-2FC6-4CC6-BF57-774C7A66E703}">
   <ds:schemaRefs>

</xml_diff>